<commit_message>
commit 20250709 Modif html/CSS/ts/pictures
</commit_message>
<xml_diff>
--- a/0_doc/RessouMaquette.pptx
+++ b/0_doc/RessouMaquette.pptx
@@ -142,7 +142,7 @@
       </p:grpSpPr>
       <p:sp>
         <p:nvSpPr>
-          <p:cNvPr id="1838449250" name="Espace réservé d'en-tête 1"/>
+          <p:cNvPr id="2120595524" name="Espace réservé d'en-tête 1"/>
           <p:cNvSpPr>
             <a:spLocks noGrp="1"/>
           </p:cNvSpPr>
@@ -176,7 +176,7 @@
       </p:sp>
       <p:sp>
         <p:nvSpPr>
-          <p:cNvPr id="504269480" name="Espace réservé pour la date 2"/>
+          <p:cNvPr id="304751125" name="Espace réservé pour la date 2"/>
           <p:cNvSpPr>
             <a:spLocks noGrp="1"/>
           </p:cNvSpPr>
@@ -214,7 +214,7 @@
       </p:sp>
       <p:sp>
         <p:nvSpPr>
-          <p:cNvPr id="1439394077" name="Espace réservé pour l'image de la diapositive 3"/>
+          <p:cNvPr id="983950958" name="Espace réservé pour l'image de la diapositive 3"/>
           <p:cNvSpPr>
             <a:spLocks noChangeAspect="1" noGrp="1" noRot="1"/>
           </p:cNvSpPr>
@@ -250,7 +250,7 @@
       </p:sp>
       <p:sp>
         <p:nvSpPr>
-          <p:cNvPr id="365583144" name="Remarques Espace réservé 4"/>
+          <p:cNvPr id="871708923" name="Remarques Espace réservé 4"/>
           <p:cNvSpPr>
             <a:spLocks noGrp="1"/>
           </p:cNvSpPr>
@@ -324,7 +324,7 @@
       </p:sp>
       <p:sp>
         <p:nvSpPr>
-          <p:cNvPr id="604576320" name="Espace réservé du pied de page 5"/>
+          <p:cNvPr id="56072435" name="Espace réservé du pied de page 5"/>
           <p:cNvSpPr>
             <a:spLocks noGrp="1"/>
           </p:cNvSpPr>
@@ -358,7 +358,7 @@
       </p:sp>
       <p:sp>
         <p:nvSpPr>
-          <p:cNvPr id="2052116819" name="Espace réservé du numéro de diapositive 6"/>
+          <p:cNvPr id="1565647757" name="Espace réservé du numéro de diapositive 6"/>
           <p:cNvSpPr>
             <a:spLocks noGrp="1"/>
           </p:cNvSpPr>
@@ -511,7 +511,7 @@
       </p:grpSpPr>
       <p:sp>
         <p:nvSpPr>
-          <p:cNvPr id="588395737" name="Slide Image Placeholder 1"/>
+          <p:cNvPr id="1975474876" name="Slide Image Placeholder 1"/>
           <p:cNvSpPr>
             <a:spLocks noChangeAspect="1" noGrp="1" noRot="1"/>
           </p:cNvSpPr>
@@ -523,7 +523,7 @@
       </p:sp>
       <p:sp>
         <p:nvSpPr>
-          <p:cNvPr id="1696980585" name="Notes Placeholder 2"/>
+          <p:cNvPr id="1659013256" name="Notes Placeholder 2"/>
           <p:cNvSpPr>
             <a:spLocks noGrp="1"/>
           </p:cNvSpPr>
@@ -545,7 +545,7 @@
       </p:sp>
       <p:sp>
         <p:nvSpPr>
-          <p:cNvPr id="1988897938" name="Slide Number Placeholder 3"/>
+          <p:cNvPr id="2080384133" name="Slide Number Placeholder 3"/>
           <p:cNvSpPr>
             <a:spLocks noGrp="1"/>
           </p:cNvSpPr>
@@ -593,7 +593,7 @@
       </p:grpSpPr>
       <p:sp>
         <p:nvSpPr>
-          <p:cNvPr id="742628521" name="Slide Image Placeholder 1"/>
+          <p:cNvPr id="1002835677" name="Slide Image Placeholder 1"/>
           <p:cNvSpPr>
             <a:spLocks noChangeAspect="1" noGrp="1" noRot="1"/>
           </p:cNvSpPr>
@@ -605,7 +605,7 @@
       </p:sp>
       <p:sp>
         <p:nvSpPr>
-          <p:cNvPr id="200414354" name="Notes Placeholder 2"/>
+          <p:cNvPr id="132330286" name="Notes Placeholder 2"/>
           <p:cNvSpPr>
             <a:spLocks noGrp="1"/>
           </p:cNvSpPr>
@@ -627,7 +627,7 @@
       </p:sp>
       <p:sp>
         <p:nvSpPr>
-          <p:cNvPr id="1422490727" name="Slide Number Placeholder 3"/>
+          <p:cNvPr id="1349065991" name="Slide Number Placeholder 3"/>
           <p:cNvSpPr>
             <a:spLocks noGrp="1"/>
           </p:cNvSpPr>
@@ -675,7 +675,7 @@
       </p:grpSpPr>
       <p:sp>
         <p:nvSpPr>
-          <p:cNvPr id="107635090" name="Slide Image Placeholder 1"/>
+          <p:cNvPr id="82446492" name="Slide Image Placeholder 1"/>
           <p:cNvSpPr>
             <a:spLocks noChangeAspect="1" noGrp="1" noRot="1"/>
           </p:cNvSpPr>
@@ -687,7 +687,7 @@
       </p:sp>
       <p:sp>
         <p:nvSpPr>
-          <p:cNvPr id="1368894972" name="Notes Placeholder 2"/>
+          <p:cNvPr id="269408490" name="Notes Placeholder 2"/>
           <p:cNvSpPr>
             <a:spLocks noGrp="1"/>
           </p:cNvSpPr>
@@ -709,7 +709,7 @@
       </p:sp>
       <p:sp>
         <p:nvSpPr>
-          <p:cNvPr id="1495343804" name="Slide Number Placeholder 3"/>
+          <p:cNvPr id="1786721199" name="Slide Number Placeholder 3"/>
           <p:cNvSpPr>
             <a:spLocks noGrp="1"/>
           </p:cNvSpPr>
@@ -757,7 +757,7 @@
       </p:grpSpPr>
       <p:sp>
         <p:nvSpPr>
-          <p:cNvPr id="2112186387" name="Espace réservé pour l'image de la diapositive 1"/>
+          <p:cNvPr id="1075619207" name="Espace réservé pour l'image de la diapositive 1"/>
           <p:cNvSpPr>
             <a:spLocks noChangeAspect="1" noGrp="1" noRot="1"/>
           </p:cNvSpPr>
@@ -774,7 +774,7 @@
       </p:sp>
       <p:sp>
         <p:nvSpPr>
-          <p:cNvPr id="227512908" name="Remarques Espace réservé 2"/>
+          <p:cNvPr id="1071229276" name="Remarques Espace réservé 2"/>
           <p:cNvSpPr>
             <a:spLocks noGrp="1"/>
           </p:cNvSpPr>
@@ -799,7 +799,7 @@
       </p:sp>
       <p:sp>
         <p:nvSpPr>
-          <p:cNvPr id="766814351" name="Espace réservé pour le numéro de diapositive 3"/>
+          <p:cNvPr id="1864062292" name="Espace réservé pour le numéro de diapositive 3"/>
           <p:cNvSpPr>
             <a:spLocks noGrp="1"/>
           </p:cNvSpPr>
@@ -847,7 +847,7 @@
       </p:grpSpPr>
       <p:sp>
         <p:nvSpPr>
-          <p:cNvPr id="114740853" name="Espace réservé pour l'image de la diapositive 1"/>
+          <p:cNvPr id="280900488" name="Espace réservé pour l'image de la diapositive 1"/>
           <p:cNvSpPr>
             <a:spLocks noChangeAspect="1" noGrp="1" noRot="1"/>
           </p:cNvSpPr>
@@ -864,7 +864,7 @@
       </p:sp>
       <p:sp>
         <p:nvSpPr>
-          <p:cNvPr id="1588097757" name="Remarques Espace réservé 2"/>
+          <p:cNvPr id="1551406682" name="Remarques Espace réservé 2"/>
           <p:cNvSpPr>
             <a:spLocks noGrp="1"/>
           </p:cNvSpPr>
@@ -889,7 +889,7 @@
       </p:sp>
       <p:sp>
         <p:nvSpPr>
-          <p:cNvPr id="1950428494" name="Espace réservé pour le numéro de diapositive 3"/>
+          <p:cNvPr id="877696998" name="Espace réservé pour le numéro de diapositive 3"/>
           <p:cNvSpPr>
             <a:spLocks noGrp="1"/>
           </p:cNvSpPr>
@@ -937,7 +937,7 @@
       </p:grpSpPr>
       <p:sp>
         <p:nvSpPr>
-          <p:cNvPr id="1725672589" name="Espace réservé pour l'image de la diapositive 1"/>
+          <p:cNvPr id="1863711485" name="Espace réservé pour l'image de la diapositive 1"/>
           <p:cNvSpPr>
             <a:spLocks noChangeAspect="1" noGrp="1" noRot="1"/>
           </p:cNvSpPr>
@@ -954,7 +954,7 @@
       </p:sp>
       <p:sp>
         <p:nvSpPr>
-          <p:cNvPr id="1090439961" name="Remarques Espace réservé 2"/>
+          <p:cNvPr id="691443078" name="Remarques Espace réservé 2"/>
           <p:cNvSpPr>
             <a:spLocks noGrp="1"/>
           </p:cNvSpPr>
@@ -979,7 +979,7 @@
       </p:sp>
       <p:sp>
         <p:nvSpPr>
-          <p:cNvPr id="739140669" name="Espace réservé pour le numéro de diapositive 3"/>
+          <p:cNvPr id="1209582370" name="Espace réservé pour le numéro de diapositive 3"/>
           <p:cNvSpPr>
             <a:spLocks noGrp="1"/>
           </p:cNvSpPr>
@@ -1027,7 +1027,7 @@
       </p:grpSpPr>
       <p:sp>
         <p:nvSpPr>
-          <p:cNvPr id="1910949405" name="Espace réservé pour l'image de la diapositive 1"/>
+          <p:cNvPr id="1492811491" name="Espace réservé pour l'image de la diapositive 1"/>
           <p:cNvSpPr>
             <a:spLocks noChangeAspect="1" noGrp="1" noRot="1"/>
           </p:cNvSpPr>
@@ -1044,7 +1044,7 @@
       </p:sp>
       <p:sp>
         <p:nvSpPr>
-          <p:cNvPr id="180509333" name="Remarques Espace réservé 2"/>
+          <p:cNvPr id="923388448" name="Remarques Espace réservé 2"/>
           <p:cNvSpPr>
             <a:spLocks noGrp="1"/>
           </p:cNvSpPr>
@@ -1069,7 +1069,7 @@
       </p:sp>
       <p:sp>
         <p:nvSpPr>
-          <p:cNvPr id="1787405981" name="Espace réservé pour le numéro de diapositive 3"/>
+          <p:cNvPr id="600191318" name="Espace réservé pour le numéro de diapositive 3"/>
           <p:cNvSpPr>
             <a:spLocks noGrp="1"/>
           </p:cNvSpPr>
@@ -1117,7 +1117,7 @@
       </p:grpSpPr>
       <p:sp>
         <p:nvSpPr>
-          <p:cNvPr id="1981808531" name="Espace réservé pour l'image de la diapositive 1"/>
+          <p:cNvPr id="1353289298" name="Espace réservé pour l'image de la diapositive 1"/>
           <p:cNvSpPr>
             <a:spLocks noChangeAspect="1" noGrp="1" noRot="1"/>
           </p:cNvSpPr>
@@ -1134,7 +1134,7 @@
       </p:sp>
       <p:sp>
         <p:nvSpPr>
-          <p:cNvPr id="1859529560" name="Remarques Espace réservé 2"/>
+          <p:cNvPr id="1493909470" name="Remarques Espace réservé 2"/>
           <p:cNvSpPr>
             <a:spLocks noGrp="1"/>
           </p:cNvSpPr>
@@ -1159,7 +1159,7 @@
       </p:sp>
       <p:sp>
         <p:nvSpPr>
-          <p:cNvPr id="1953571470" name="Espace réservé pour le numéro de diapositive 3"/>
+          <p:cNvPr id="1666303146" name="Espace réservé pour le numéro de diapositive 3"/>
           <p:cNvSpPr>
             <a:spLocks noGrp="1"/>
           </p:cNvSpPr>
@@ -1207,7 +1207,7 @@
       </p:grpSpPr>
       <p:sp>
         <p:nvSpPr>
-          <p:cNvPr id="1885781647" name="Espace réservé pour l'image de la diapositive 1"/>
+          <p:cNvPr id="584093853" name="Espace réservé pour l'image de la diapositive 1"/>
           <p:cNvSpPr>
             <a:spLocks noChangeAspect="1" noGrp="1" noRot="1"/>
           </p:cNvSpPr>
@@ -1224,7 +1224,7 @@
       </p:sp>
       <p:sp>
         <p:nvSpPr>
-          <p:cNvPr id="21535492" name="Remarques Espace réservé 2"/>
+          <p:cNvPr id="708917365" name="Remarques Espace réservé 2"/>
           <p:cNvSpPr>
             <a:spLocks noGrp="1"/>
           </p:cNvSpPr>
@@ -1249,7 +1249,7 @@
       </p:sp>
       <p:sp>
         <p:nvSpPr>
-          <p:cNvPr id="1117885206" name="Espace réservé pour le numéro de diapositive 3"/>
+          <p:cNvPr id="519399320" name="Espace réservé pour le numéro de diapositive 3"/>
           <p:cNvSpPr>
             <a:spLocks noGrp="1"/>
           </p:cNvSpPr>
@@ -1297,7 +1297,7 @@
       </p:grpSpPr>
       <p:sp>
         <p:nvSpPr>
-          <p:cNvPr id="468807398" name="Titre 1"/>
+          <p:cNvPr id="1408789523" name="Titre 1"/>
           <p:cNvSpPr>
             <a:spLocks noGrp="1"/>
           </p:cNvSpPr>
@@ -1332,7 +1332,7 @@
       </p:sp>
       <p:sp>
         <p:nvSpPr>
-          <p:cNvPr id="1626487715" name="Sous-titre 2"/>
+          <p:cNvPr id="708850951" name="Sous-titre 2"/>
           <p:cNvSpPr>
             <a:spLocks noGrp="1"/>
           </p:cNvSpPr>
@@ -1400,7 +1400,7 @@
       </p:sp>
       <p:sp>
         <p:nvSpPr>
-          <p:cNvPr id="1272699642" name="Espace réservé de la date 3"/>
+          <p:cNvPr id="2072612484" name="Espace réservé de la date 3"/>
           <p:cNvSpPr>
             <a:spLocks noGrp="1"/>
           </p:cNvSpPr>
@@ -1426,7 +1426,7 @@
       </p:sp>
       <p:sp>
         <p:nvSpPr>
-          <p:cNvPr id="2087386454" name="Espace réservé du pied de page 4"/>
+          <p:cNvPr id="306051680" name="Espace réservé du pied de page 4"/>
           <p:cNvSpPr>
             <a:spLocks noGrp="1"/>
           </p:cNvSpPr>
@@ -1448,7 +1448,7 @@
       </p:sp>
       <p:sp>
         <p:nvSpPr>
-          <p:cNvPr id="1549616927" name="Espace réservé du numéro de diapositive 5"/>
+          <p:cNvPr id="746435795" name="Espace réservé du numéro de diapositive 5"/>
           <p:cNvSpPr>
             <a:spLocks noGrp="1"/>
           </p:cNvSpPr>
@@ -1499,7 +1499,7 @@
       </p:grpSpPr>
       <p:sp>
         <p:nvSpPr>
-          <p:cNvPr id="55623403" name="Titre 1"/>
+          <p:cNvPr id="1443261" name="Titre 1"/>
           <p:cNvSpPr>
             <a:spLocks noGrp="1"/>
           </p:cNvSpPr>
@@ -1525,7 +1525,7 @@
       </p:sp>
       <p:sp>
         <p:nvSpPr>
-          <p:cNvPr id="636574750" name="Espace réservé du texte vertical 2"/>
+          <p:cNvPr id="2063515857" name="Espace réservé du texte vertical 2"/>
           <p:cNvSpPr>
             <a:spLocks noGrp="1"/>
           </p:cNvSpPr>
@@ -1591,7 +1591,7 @@
       </p:sp>
       <p:sp>
         <p:nvSpPr>
-          <p:cNvPr id="55233285" name="Espace réservé de la date 3"/>
+          <p:cNvPr id="19364773" name="Espace réservé de la date 3"/>
           <p:cNvSpPr>
             <a:spLocks noGrp="1"/>
           </p:cNvSpPr>
@@ -1617,7 +1617,7 @@
       </p:sp>
       <p:sp>
         <p:nvSpPr>
-          <p:cNvPr id="710401880" name="Espace réservé du pied de page 4"/>
+          <p:cNvPr id="999979985" name="Espace réservé du pied de page 4"/>
           <p:cNvSpPr>
             <a:spLocks noGrp="1"/>
           </p:cNvSpPr>
@@ -1639,7 +1639,7 @@
       </p:sp>
       <p:sp>
         <p:nvSpPr>
-          <p:cNvPr id="1402300262" name="Espace réservé du numéro de diapositive 5"/>
+          <p:cNvPr id="499166962" name="Espace réservé du numéro de diapositive 5"/>
           <p:cNvSpPr>
             <a:spLocks noGrp="1"/>
           </p:cNvSpPr>
@@ -1690,7 +1690,7 @@
       </p:grpSpPr>
       <p:sp>
         <p:nvSpPr>
-          <p:cNvPr id="1435960130" name="Titre vertical 1"/>
+          <p:cNvPr id="629203604" name="Titre vertical 1"/>
           <p:cNvSpPr>
             <a:spLocks noGrp="1"/>
           </p:cNvSpPr>
@@ -1721,7 +1721,7 @@
       </p:sp>
       <p:sp>
         <p:nvSpPr>
-          <p:cNvPr id="834853376" name="Espace réservé du texte vertical 2"/>
+          <p:cNvPr id="1420538567" name="Espace réservé du texte vertical 2"/>
           <p:cNvSpPr>
             <a:spLocks noGrp="1"/>
           </p:cNvSpPr>
@@ -1792,7 +1792,7 @@
       </p:sp>
       <p:sp>
         <p:nvSpPr>
-          <p:cNvPr id="321905977" name="Espace réservé de la date 3"/>
+          <p:cNvPr id="1023600026" name="Espace réservé de la date 3"/>
           <p:cNvSpPr>
             <a:spLocks noGrp="1"/>
           </p:cNvSpPr>
@@ -1818,7 +1818,7 @@
       </p:sp>
       <p:sp>
         <p:nvSpPr>
-          <p:cNvPr id="742676567" name="Espace réservé du pied de page 4"/>
+          <p:cNvPr id="1002700170" name="Espace réservé du pied de page 4"/>
           <p:cNvSpPr>
             <a:spLocks noGrp="1"/>
           </p:cNvSpPr>
@@ -1840,7 +1840,7 @@
       </p:sp>
       <p:sp>
         <p:nvSpPr>
-          <p:cNvPr id="376227959" name="Espace réservé du numéro de diapositive 5"/>
+          <p:cNvPr id="632393412" name="Espace réservé du numéro de diapositive 5"/>
           <p:cNvSpPr>
             <a:spLocks noGrp="1"/>
           </p:cNvSpPr>
@@ -1891,7 +1891,7 @@
       </p:grpSpPr>
       <p:sp>
         <p:nvSpPr>
-          <p:cNvPr id="51991740" name="Titre 1"/>
+          <p:cNvPr id="1197528757" name="Titre 1"/>
           <p:cNvSpPr>
             <a:spLocks noGrp="1"/>
           </p:cNvSpPr>
@@ -1917,7 +1917,7 @@
       </p:sp>
       <p:sp>
         <p:nvSpPr>
-          <p:cNvPr id="1557243800" name="Espace réservé du contenu 2"/>
+          <p:cNvPr id="1778838165" name="Espace réservé du contenu 2"/>
           <p:cNvSpPr>
             <a:spLocks noGrp="1"/>
           </p:cNvSpPr>
@@ -1983,7 +1983,7 @@
       </p:sp>
       <p:sp>
         <p:nvSpPr>
-          <p:cNvPr id="1080493305" name="Espace réservé de la date 3"/>
+          <p:cNvPr id="983174309" name="Espace réservé de la date 3"/>
           <p:cNvSpPr>
             <a:spLocks noGrp="1"/>
           </p:cNvSpPr>
@@ -2009,7 +2009,7 @@
       </p:sp>
       <p:sp>
         <p:nvSpPr>
-          <p:cNvPr id="1874747875" name="Espace réservé du pied de page 4"/>
+          <p:cNvPr id="1838979573" name="Espace réservé du pied de page 4"/>
           <p:cNvSpPr>
             <a:spLocks noGrp="1"/>
           </p:cNvSpPr>
@@ -2031,7 +2031,7 @@
       </p:sp>
       <p:sp>
         <p:nvSpPr>
-          <p:cNvPr id="808261254" name="Espace réservé du numéro de diapositive 5"/>
+          <p:cNvPr id="589765309" name="Espace réservé du numéro de diapositive 5"/>
           <p:cNvSpPr>
             <a:spLocks noGrp="1"/>
           </p:cNvSpPr>
@@ -2082,7 +2082,7 @@
       </p:grpSpPr>
       <p:sp>
         <p:nvSpPr>
-          <p:cNvPr id="1449366479" name="Titre 1"/>
+          <p:cNvPr id="834453990" name="Titre 1"/>
           <p:cNvSpPr>
             <a:spLocks noGrp="1"/>
           </p:cNvSpPr>
@@ -2117,7 +2117,7 @@
       </p:sp>
       <p:sp>
         <p:nvSpPr>
-          <p:cNvPr id="449669370" name="Espace réservé du texte 2"/>
+          <p:cNvPr id="1780438026" name="Espace réservé du texte 2"/>
           <p:cNvSpPr>
             <a:spLocks noGrp="1"/>
           </p:cNvSpPr>
@@ -2239,7 +2239,7 @@
       </p:sp>
       <p:sp>
         <p:nvSpPr>
-          <p:cNvPr id="418587988" name="Espace réservé de la date 3"/>
+          <p:cNvPr id="1957746765" name="Espace réservé de la date 3"/>
           <p:cNvSpPr>
             <a:spLocks noGrp="1"/>
           </p:cNvSpPr>
@@ -2265,7 +2265,7 @@
       </p:sp>
       <p:sp>
         <p:nvSpPr>
-          <p:cNvPr id="1329661290" name="Espace réservé du pied de page 4"/>
+          <p:cNvPr id="356227082" name="Espace réservé du pied de page 4"/>
           <p:cNvSpPr>
             <a:spLocks noGrp="1"/>
           </p:cNvSpPr>
@@ -2287,7 +2287,7 @@
       </p:sp>
       <p:sp>
         <p:nvSpPr>
-          <p:cNvPr id="1930524253" name="Espace réservé du numéro de diapositive 5"/>
+          <p:cNvPr id="507769538" name="Espace réservé du numéro de diapositive 5"/>
           <p:cNvSpPr>
             <a:spLocks noGrp="1"/>
           </p:cNvSpPr>
@@ -2338,7 +2338,7 @@
       </p:grpSpPr>
       <p:sp>
         <p:nvSpPr>
-          <p:cNvPr id="135333848" name="Titre 1"/>
+          <p:cNvPr id="1856032355" name="Titre 1"/>
           <p:cNvSpPr>
             <a:spLocks noGrp="1"/>
           </p:cNvSpPr>
@@ -2364,7 +2364,7 @@
       </p:sp>
       <p:sp>
         <p:nvSpPr>
-          <p:cNvPr id="979727062" name="Espace réservé du contenu 2"/>
+          <p:cNvPr id="2096964760" name="Espace réservé du contenu 2"/>
           <p:cNvSpPr>
             <a:spLocks noGrp="1"/>
           </p:cNvSpPr>
@@ -2435,7 +2435,7 @@
       </p:sp>
       <p:sp>
         <p:nvSpPr>
-          <p:cNvPr id="1197486323" name="Espace réservé du contenu 3"/>
+          <p:cNvPr id="338794878" name="Espace réservé du contenu 3"/>
           <p:cNvSpPr>
             <a:spLocks noGrp="1"/>
           </p:cNvSpPr>
@@ -2506,7 +2506,7 @@
       </p:sp>
       <p:sp>
         <p:nvSpPr>
-          <p:cNvPr id="430726746" name="Espace réservé de la date 4"/>
+          <p:cNvPr id="1627074433" name="Espace réservé de la date 4"/>
           <p:cNvSpPr>
             <a:spLocks noGrp="1"/>
           </p:cNvSpPr>
@@ -2532,7 +2532,7 @@
       </p:sp>
       <p:sp>
         <p:nvSpPr>
-          <p:cNvPr id="1182815507" name="Espace réservé du pied de page 5"/>
+          <p:cNvPr id="1017275874" name="Espace réservé du pied de page 5"/>
           <p:cNvSpPr>
             <a:spLocks noGrp="1"/>
           </p:cNvSpPr>
@@ -2554,7 +2554,7 @@
       </p:sp>
       <p:sp>
         <p:nvSpPr>
-          <p:cNvPr id="1023860346" name="Espace réservé du numéro de diapositive 6"/>
+          <p:cNvPr id="105113384" name="Espace réservé du numéro de diapositive 6"/>
           <p:cNvSpPr>
             <a:spLocks noGrp="1"/>
           </p:cNvSpPr>
@@ -2605,7 +2605,7 @@
       </p:grpSpPr>
       <p:sp>
         <p:nvSpPr>
-          <p:cNvPr id="226398425" name="Titre 1"/>
+          <p:cNvPr id="789948726" name="Titre 1"/>
           <p:cNvSpPr>
             <a:spLocks noGrp="1"/>
           </p:cNvSpPr>
@@ -2636,7 +2636,7 @@
       </p:sp>
       <p:sp>
         <p:nvSpPr>
-          <p:cNvPr id="912745818" name="Espace réservé du texte 2"/>
+          <p:cNvPr id="1581034684" name="Espace réservé du texte 2"/>
           <p:cNvSpPr>
             <a:spLocks noGrp="1"/>
           </p:cNvSpPr>
@@ -2704,7 +2704,7 @@
       </p:sp>
       <p:sp>
         <p:nvSpPr>
-          <p:cNvPr id="1944701773" name="Espace réservé du contenu 3"/>
+          <p:cNvPr id="2061676128" name="Espace réservé du contenu 3"/>
           <p:cNvSpPr>
             <a:spLocks noGrp="1"/>
           </p:cNvSpPr>
@@ -2775,7 +2775,7 @@
       </p:sp>
       <p:sp>
         <p:nvSpPr>
-          <p:cNvPr id="1685578911" name="Espace réservé du texte 4"/>
+          <p:cNvPr id="1308525726" name="Espace réservé du texte 4"/>
           <p:cNvSpPr>
             <a:spLocks noGrp="1"/>
           </p:cNvSpPr>
@@ -2843,7 +2843,7 @@
       </p:sp>
       <p:sp>
         <p:nvSpPr>
-          <p:cNvPr id="128827756" name="Espace réservé du contenu 5"/>
+          <p:cNvPr id="1826895708" name="Espace réservé du contenu 5"/>
           <p:cNvSpPr>
             <a:spLocks noGrp="1"/>
           </p:cNvSpPr>
@@ -2914,7 +2914,7 @@
       </p:sp>
       <p:sp>
         <p:nvSpPr>
-          <p:cNvPr id="1972922512" name="Espace réservé de la date 6"/>
+          <p:cNvPr id="1822149277" name="Espace réservé de la date 6"/>
           <p:cNvSpPr>
             <a:spLocks noGrp="1"/>
           </p:cNvSpPr>
@@ -2940,7 +2940,7 @@
       </p:sp>
       <p:sp>
         <p:nvSpPr>
-          <p:cNvPr id="1319730402" name="Espace réservé du pied de page 7"/>
+          <p:cNvPr id="1948360415" name="Espace réservé du pied de page 7"/>
           <p:cNvSpPr>
             <a:spLocks noGrp="1"/>
           </p:cNvSpPr>
@@ -2962,7 +2962,7 @@
       </p:sp>
       <p:sp>
         <p:nvSpPr>
-          <p:cNvPr id="583788566" name="Espace réservé du numéro de diapositive 8"/>
+          <p:cNvPr id="243822666" name="Espace réservé du numéro de diapositive 8"/>
           <p:cNvSpPr>
             <a:spLocks noGrp="1"/>
           </p:cNvSpPr>
@@ -3013,7 +3013,7 @@
       </p:grpSpPr>
       <p:sp>
         <p:nvSpPr>
-          <p:cNvPr id="1398987617" name="Titre 1"/>
+          <p:cNvPr id="1899663116" name="Titre 1"/>
           <p:cNvSpPr>
             <a:spLocks noGrp="1"/>
           </p:cNvSpPr>
@@ -3039,7 +3039,7 @@
       </p:sp>
       <p:sp>
         <p:nvSpPr>
-          <p:cNvPr id="1970826131" name="Espace réservé de la date 2"/>
+          <p:cNvPr id="347989273" name="Espace réservé de la date 2"/>
           <p:cNvSpPr>
             <a:spLocks noGrp="1"/>
           </p:cNvSpPr>
@@ -3065,7 +3065,7 @@
       </p:sp>
       <p:sp>
         <p:nvSpPr>
-          <p:cNvPr id="196459687" name="Espace réservé du pied de page 3"/>
+          <p:cNvPr id="1224889590" name="Espace réservé du pied de page 3"/>
           <p:cNvSpPr>
             <a:spLocks noGrp="1"/>
           </p:cNvSpPr>
@@ -3087,7 +3087,7 @@
       </p:sp>
       <p:sp>
         <p:nvSpPr>
-          <p:cNvPr id="837294114" name="Espace réservé du numéro de diapositive 4"/>
+          <p:cNvPr id="950213731" name="Espace réservé du numéro de diapositive 4"/>
           <p:cNvSpPr>
             <a:spLocks noGrp="1"/>
           </p:cNvSpPr>
@@ -3138,7 +3138,7 @@
       </p:grpSpPr>
       <p:sp>
         <p:nvSpPr>
-          <p:cNvPr id="691010879" name="Espace réservé de la date 1"/>
+          <p:cNvPr id="989752190" name="Espace réservé de la date 1"/>
           <p:cNvSpPr>
             <a:spLocks noGrp="1"/>
           </p:cNvSpPr>
@@ -3164,7 +3164,7 @@
       </p:sp>
       <p:sp>
         <p:nvSpPr>
-          <p:cNvPr id="1343760353" name="Espace réservé du pied de page 2"/>
+          <p:cNvPr id="542333968" name="Espace réservé du pied de page 2"/>
           <p:cNvSpPr>
             <a:spLocks noGrp="1"/>
           </p:cNvSpPr>
@@ -3186,7 +3186,7 @@
       </p:sp>
       <p:sp>
         <p:nvSpPr>
-          <p:cNvPr id="344077970" name="Espace réservé du numéro de diapositive 3"/>
+          <p:cNvPr id="1111107138" name="Espace réservé du numéro de diapositive 3"/>
           <p:cNvSpPr>
             <a:spLocks noGrp="1"/>
           </p:cNvSpPr>
@@ -3237,7 +3237,7 @@
       </p:grpSpPr>
       <p:sp>
         <p:nvSpPr>
-          <p:cNvPr id="888695305" name="Titre 1"/>
+          <p:cNvPr id="1332719042" name="Titre 1"/>
           <p:cNvSpPr>
             <a:spLocks noGrp="1"/>
           </p:cNvSpPr>
@@ -3272,7 +3272,7 @@
       </p:sp>
       <p:sp>
         <p:nvSpPr>
-          <p:cNvPr id="669945772" name="Espace réservé du contenu 2"/>
+          <p:cNvPr id="333384785" name="Espace réservé du contenu 2"/>
           <p:cNvSpPr>
             <a:spLocks noGrp="1"/>
           </p:cNvSpPr>
@@ -3371,7 +3371,7 @@
       </p:sp>
       <p:sp>
         <p:nvSpPr>
-          <p:cNvPr id="947710627" name="Espace réservé du texte 3"/>
+          <p:cNvPr id="346222030" name="Espace réservé du texte 3"/>
           <p:cNvSpPr>
             <a:spLocks noGrp="1"/>
           </p:cNvSpPr>
@@ -3439,7 +3439,7 @@
       </p:sp>
       <p:sp>
         <p:nvSpPr>
-          <p:cNvPr id="1473398766" name="Espace réservé de la date 4"/>
+          <p:cNvPr id="662997123" name="Espace réservé de la date 4"/>
           <p:cNvSpPr>
             <a:spLocks noGrp="1"/>
           </p:cNvSpPr>
@@ -3465,7 +3465,7 @@
       </p:sp>
       <p:sp>
         <p:nvSpPr>
-          <p:cNvPr id="1103679359" name="Espace réservé du pied de page 5"/>
+          <p:cNvPr id="186410552" name="Espace réservé du pied de page 5"/>
           <p:cNvSpPr>
             <a:spLocks noGrp="1"/>
           </p:cNvSpPr>
@@ -3487,7 +3487,7 @@
       </p:sp>
       <p:sp>
         <p:nvSpPr>
-          <p:cNvPr id="495536148" name="Espace réservé du numéro de diapositive 6"/>
+          <p:cNvPr id="484014543" name="Espace réservé du numéro de diapositive 6"/>
           <p:cNvSpPr>
             <a:spLocks noGrp="1"/>
           </p:cNvSpPr>
@@ -3538,7 +3538,7 @@
       </p:grpSpPr>
       <p:sp>
         <p:nvSpPr>
-          <p:cNvPr id="1210035077" name="Titre 1"/>
+          <p:cNvPr id="744005364" name="Titre 1"/>
           <p:cNvSpPr>
             <a:spLocks noGrp="1"/>
           </p:cNvSpPr>
@@ -3573,7 +3573,7 @@
       </p:sp>
       <p:sp>
         <p:nvSpPr>
-          <p:cNvPr id="1139117996" name="Espace réservé pour une image 2"/>
+          <p:cNvPr id="193641669" name="Espace réservé pour une image 2"/>
           <p:cNvSpPr>
             <a:spLocks noChangeAspect="1" noGrp="1"/>
           </p:cNvSpPr>
@@ -3641,7 +3641,7 @@
       </p:sp>
       <p:sp>
         <p:nvSpPr>
-          <p:cNvPr id="1753092878" name="Espace réservé du texte 3"/>
+          <p:cNvPr id="1408378356" name="Espace réservé du texte 3"/>
           <p:cNvSpPr>
             <a:spLocks noGrp="1"/>
           </p:cNvSpPr>
@@ -3709,7 +3709,7 @@
       </p:sp>
       <p:sp>
         <p:nvSpPr>
-          <p:cNvPr id="319141134" name="Espace réservé de la date 4"/>
+          <p:cNvPr id="895458488" name="Espace réservé de la date 4"/>
           <p:cNvSpPr>
             <a:spLocks noGrp="1"/>
           </p:cNvSpPr>
@@ -3735,7 +3735,7 @@
       </p:sp>
       <p:sp>
         <p:nvSpPr>
-          <p:cNvPr id="104364997" name="Espace réservé du pied de page 5"/>
+          <p:cNvPr id="216735983" name="Espace réservé du pied de page 5"/>
           <p:cNvSpPr>
             <a:spLocks noGrp="1"/>
           </p:cNvSpPr>
@@ -3757,7 +3757,7 @@
       </p:sp>
       <p:sp>
         <p:nvSpPr>
-          <p:cNvPr id="1793299166" name="Espace réservé du numéro de diapositive 6"/>
+          <p:cNvPr id="738477056" name="Espace réservé du numéro de diapositive 6"/>
           <p:cNvSpPr>
             <a:spLocks noGrp="1"/>
           </p:cNvSpPr>
@@ -3813,7 +3813,7 @@
       </p:grpSpPr>
       <p:sp>
         <p:nvSpPr>
-          <p:cNvPr id="2076117159" name="Espace réservé du titre 1"/>
+          <p:cNvPr id="921245251" name="Espace réservé du titre 1"/>
           <p:cNvSpPr>
             <a:spLocks noGrp="1"/>
           </p:cNvSpPr>
@@ -3849,7 +3849,7 @@
       </p:sp>
       <p:sp>
         <p:nvSpPr>
-          <p:cNvPr id="26012930" name="Espace réservé du texte 2"/>
+          <p:cNvPr id="1470970080" name="Espace réservé du texte 2"/>
           <p:cNvSpPr>
             <a:spLocks noGrp="1"/>
           </p:cNvSpPr>
@@ -3925,7 +3925,7 @@
       </p:sp>
       <p:sp>
         <p:nvSpPr>
-          <p:cNvPr id="687392820" name="Espace réservé de la date 3"/>
+          <p:cNvPr id="2103831518" name="Espace réservé de la date 3"/>
           <p:cNvSpPr>
             <a:spLocks noGrp="1"/>
           </p:cNvSpPr>
@@ -3969,7 +3969,7 @@
       </p:sp>
       <p:sp>
         <p:nvSpPr>
-          <p:cNvPr id="769720864" name="Espace réservé du pied de page 4"/>
+          <p:cNvPr id="6155851" name="Espace réservé du pied de page 4"/>
           <p:cNvSpPr>
             <a:spLocks noGrp="1"/>
           </p:cNvSpPr>
@@ -4009,7 +4009,7 @@
       </p:sp>
       <p:sp>
         <p:nvSpPr>
-          <p:cNvPr id="732688350" name="Espace réservé du numéro de diapositive 5"/>
+          <p:cNvPr id="807221029" name="Espace réservé du numéro de diapositive 5"/>
           <p:cNvSpPr>
             <a:spLocks noGrp="1"/>
           </p:cNvSpPr>
@@ -4376,7 +4376,7 @@
       </p:grpSpPr>
       <p:sp>
         <p:nvSpPr>
-          <p:cNvPr id="1478805896" name="Espace réservé du contenu 2"/>
+          <p:cNvPr id="50839752" name="Espace réservé du contenu 2"/>
           <p:cNvSpPr>
             <a:spLocks noGrp="1"/>
           </p:cNvSpPr>
@@ -4904,7 +4904,7 @@
       </p:sp>
       <p:sp>
         <p:nvSpPr>
-          <p:cNvPr id="1087523933" name=""/>
+          <p:cNvPr id="1683048252" name=""/>
           <p:cNvSpPr txBox="1"/>
           <p:nvPr/>
         </p:nvSpPr>
@@ -4959,7 +4959,7 @@
       </p:sp>
       <p:sp>
         <p:nvSpPr>
-          <p:cNvPr id="2108024606" name=""/>
+          <p:cNvPr id="1595762048" name=""/>
           <p:cNvSpPr txBox="1"/>
           <p:nvPr/>
         </p:nvSpPr>
@@ -5126,7 +5126,7 @@
       </p:sp>
       <p:sp>
         <p:nvSpPr>
-          <p:cNvPr id="389565072" name=""/>
+          <p:cNvPr id="2125845917" name=""/>
           <p:cNvSpPr txBox="1"/>
           <p:nvPr/>
         </p:nvSpPr>
@@ -5544,7 +5544,7 @@
       </p:sp>
       <p:sp>
         <p:nvSpPr>
-          <p:cNvPr id="912931729" name=""/>
+          <p:cNvPr id="422705505" name=""/>
           <p:cNvSpPr txBox="1"/>
           <p:nvPr/>
         </p:nvSpPr>
@@ -5637,7 +5637,7 @@
           <a:p>
             <a:pPr>
               <a:lnSpc>
-                <a:spcPts val="1383"/>
+                <a:spcPts val="1382"/>
               </a:lnSpc>
               <a:defRPr/>
             </a:pPr>
@@ -5724,7 +5724,7 @@
           <a:p>
             <a:pPr marL="195764" indent="-195764">
               <a:lnSpc>
-                <a:spcPts val="1383"/>
+                <a:spcPts val="1382"/>
               </a:lnSpc>
               <a:buFont typeface="Arial"/>
               <a:buChar char="–"/>
@@ -5753,7 +5753,7 @@
           <a:p>
             <a:pPr>
               <a:lnSpc>
-                <a:spcPts val="1383"/>
+                <a:spcPts val="1382"/>
               </a:lnSpc>
               <a:defRPr/>
             </a:pPr>
@@ -5903,7 +5903,7 @@
       </p:sp>
       <p:sp>
         <p:nvSpPr>
-          <p:cNvPr id="1437760570" name=""/>
+          <p:cNvPr id="764717048" name=""/>
           <p:cNvSpPr txBox="1"/>
           <p:nvPr/>
         </p:nvSpPr>
@@ -6168,7 +6168,7 @@
       </p:sp>
       <p:sp>
         <p:nvSpPr>
-          <p:cNvPr id="1064774778" name=""/>
+          <p:cNvPr id="244817972" name=""/>
           <p:cNvSpPr txBox="1"/>
           <p:nvPr/>
         </p:nvSpPr>
@@ -6340,7 +6340,7 @@
       </p:sp>
       <p:pic>
         <p:nvPicPr>
-          <p:cNvPr id="1151275257" name=""/>
+          <p:cNvPr id="617779186" name=""/>
           <p:cNvPicPr>
             <a:picLocks noChangeAspect="1"/>
           </p:cNvPicPr>
@@ -6352,7 +6352,7 @@
         </p:blipFill>
         <p:spPr bwMode="auto">
           <a:xfrm flipH="0" flipV="0">
-            <a:off x="8978828" y="866541"/>
+            <a:off x="8978828" y="866540"/>
             <a:ext cx="2723323" cy="634329"/>
           </a:xfrm>
           <a:prstGeom prst="rect">
@@ -6362,7 +6362,7 @@
       </p:pic>
       <p:pic>
         <p:nvPicPr>
-          <p:cNvPr id="580935741" name=""/>
+          <p:cNvPr id="1872001187" name=""/>
           <p:cNvPicPr>
             <a:picLocks noChangeAspect="1"/>
           </p:cNvPicPr>
@@ -6384,7 +6384,7 @@
       </p:pic>
       <p:pic>
         <p:nvPicPr>
-          <p:cNvPr id="810256556" name=""/>
+          <p:cNvPr id="111283524" name=""/>
           <p:cNvPicPr>
             <a:picLocks noChangeAspect="1"/>
           </p:cNvPicPr>
@@ -6439,7 +6439,7 @@
       </p:grpSpPr>
       <p:sp>
         <p:nvSpPr>
-          <p:cNvPr id="412187485" name=""/>
+          <p:cNvPr id="401784987" name=""/>
           <p:cNvSpPr txBox="1"/>
           <p:nvPr/>
         </p:nvSpPr>
@@ -6841,7 +6841,7 @@
       </p:sp>
       <p:sp>
         <p:nvSpPr>
-          <p:cNvPr id="459494175" name=""/>
+          <p:cNvPr id="395749080" name=""/>
           <p:cNvSpPr txBox="1"/>
           <p:nvPr/>
         </p:nvSpPr>
@@ -7071,7 +7071,7 @@
       </p:sp>
       <p:sp>
         <p:nvSpPr>
-          <p:cNvPr id="1118044009" name=""/>
+          <p:cNvPr id="691919826" name=""/>
           <p:cNvSpPr txBox="1"/>
           <p:nvPr/>
         </p:nvSpPr>
@@ -7201,7 +7201,7 @@
       </p:sp>
       <p:sp>
         <p:nvSpPr>
-          <p:cNvPr id="289177847" name=""/>
+          <p:cNvPr id="1067160529" name=""/>
           <p:cNvSpPr txBox="1"/>
           <p:nvPr/>
         </p:nvSpPr>
@@ -7385,7 +7385,7 @@
       </p:sp>
       <p:sp>
         <p:nvSpPr>
-          <p:cNvPr id="2057286304" name=""/>
+          <p:cNvPr id="467125206" name=""/>
           <p:cNvSpPr txBox="1"/>
           <p:nvPr/>
         </p:nvSpPr>
@@ -7521,7 +7521,7 @@
       </p:sp>
       <p:sp>
         <p:nvSpPr>
-          <p:cNvPr id="1319289708" name=""/>
+          <p:cNvPr id="952725032" name=""/>
           <p:cNvSpPr/>
           <p:nvPr/>
         </p:nvSpPr>
@@ -7556,7 +7556,7 @@
       </p:sp>
       <p:sp>
         <p:nvSpPr>
-          <p:cNvPr id="238628751" name=""/>
+          <p:cNvPr id="1672599478" name=""/>
           <p:cNvSpPr/>
           <p:nvPr/>
         </p:nvSpPr>
@@ -7594,7 +7594,7 @@
       </p:sp>
       <p:sp>
         <p:nvSpPr>
-          <p:cNvPr id="757701031" name=""/>
+          <p:cNvPr id="426628168" name=""/>
           <p:cNvSpPr txBox="1"/>
           <p:nvPr/>
         </p:nvSpPr>
@@ -7634,7 +7634,7 @@
       </p:sp>
       <p:sp>
         <p:nvSpPr>
-          <p:cNvPr id="2145473017" name=""/>
+          <p:cNvPr id="227491051" name=""/>
           <p:cNvSpPr txBox="1"/>
           <p:nvPr/>
         </p:nvSpPr>
@@ -7917,7 +7917,7 @@
       </p:sp>
       <p:sp>
         <p:nvSpPr>
-          <p:cNvPr id="1491508331" name=""/>
+          <p:cNvPr id="1440556763" name=""/>
           <p:cNvSpPr txBox="1"/>
           <p:nvPr/>
         </p:nvSpPr>
@@ -8051,7 +8051,7 @@
       </p:sp>
       <p:sp>
         <p:nvSpPr>
-          <p:cNvPr id="199843" name=""/>
+          <p:cNvPr id="1881592896" name=""/>
           <p:cNvSpPr txBox="1"/>
           <p:nvPr/>
         </p:nvSpPr>
@@ -8169,7 +8169,7 @@
       </p:sp>
       <p:cxnSp>
         <p:nvCxnSpPr>
-          <p:cNvPr id="1411263725" name=""/>
+          <p:cNvPr id="1152965870" name=""/>
           <p:cNvCxnSpPr/>
           <p:nvPr/>
         </p:nvCxnSpPr>
@@ -8209,7 +8209,7 @@
       </p:cxnSp>
       <p:cxnSp>
         <p:nvCxnSpPr>
-          <p:cNvPr id="1672889265" name=""/>
+          <p:cNvPr id="1830466175" name=""/>
           <p:cNvCxnSpPr/>
           <p:nvPr/>
         </p:nvCxnSpPr>
@@ -8249,7 +8249,7 @@
       </p:cxnSp>
       <p:cxnSp>
         <p:nvCxnSpPr>
-          <p:cNvPr id="2053754353" name=""/>
+          <p:cNvPr id="1002415924" name=""/>
           <p:cNvCxnSpPr/>
           <p:nvPr/>
         </p:nvCxnSpPr>
@@ -8289,7 +8289,7 @@
       </p:cxnSp>
       <p:cxnSp>
         <p:nvCxnSpPr>
-          <p:cNvPr id="1804954260" name=""/>
+          <p:cNvPr id="1555563158" name=""/>
           <p:cNvCxnSpPr/>
           <p:nvPr/>
         </p:nvCxnSpPr>
@@ -8329,7 +8329,7 @@
       </p:cxnSp>
       <p:sp>
         <p:nvSpPr>
-          <p:cNvPr id="1797981493" name=""/>
+          <p:cNvPr id="1893657997" name=""/>
           <p:cNvSpPr txBox="1"/>
           <p:nvPr/>
         </p:nvSpPr>
@@ -8443,7 +8443,7 @@
       </p:grpSpPr>
       <p:sp>
         <p:nvSpPr>
-          <p:cNvPr id="1940845664" name=""/>
+          <p:cNvPr id="999146545" name=""/>
           <p:cNvSpPr txBox="1"/>
           <p:nvPr/>
         </p:nvSpPr>
@@ -8673,7 +8673,7 @@
       </p:sp>
       <p:sp>
         <p:nvSpPr>
-          <p:cNvPr id="1386021029" name=""/>
+          <p:cNvPr id="1329406362" name=""/>
           <p:cNvSpPr txBox="1"/>
           <p:nvPr/>
         </p:nvSpPr>
@@ -8820,7 +8820,7 @@
       </p:sp>
       <p:sp>
         <p:nvSpPr>
-          <p:cNvPr id="1540816571" name=""/>
+          <p:cNvPr id="2065705184" name=""/>
           <p:cNvSpPr txBox="1"/>
           <p:nvPr/>
         </p:nvSpPr>
@@ -9004,7 +9004,7 @@
       </p:sp>
       <p:sp>
         <p:nvSpPr>
-          <p:cNvPr id="2024317702" name=""/>
+          <p:cNvPr id="929973620" name=""/>
           <p:cNvSpPr txBox="1"/>
           <p:nvPr/>
         </p:nvSpPr>
@@ -9140,7 +9140,7 @@
       </p:sp>
       <p:sp>
         <p:nvSpPr>
-          <p:cNvPr id="878929787" name=""/>
+          <p:cNvPr id="1717804485" name=""/>
           <p:cNvSpPr/>
           <p:nvPr/>
         </p:nvSpPr>
@@ -9175,12 +9175,12 @@
       </p:sp>
       <p:sp>
         <p:nvSpPr>
-          <p:cNvPr id="1833988709" name=""/>
+          <p:cNvPr id="2023883733" name=""/>
           <p:cNvSpPr/>
           <p:nvPr/>
         </p:nvSpPr>
         <p:spPr bwMode="auto">
-          <a:xfrm rot="13478923" flipH="0" flipV="0">
+          <a:xfrm rot="13478922" flipH="0" flipV="0">
             <a:off x="2319099" y="253512"/>
             <a:ext cx="466740" cy="444912"/>
           </a:xfrm>
@@ -9213,7 +9213,7 @@
       </p:sp>
       <p:sp>
         <p:nvSpPr>
-          <p:cNvPr id="1458962218" name=""/>
+          <p:cNvPr id="960391658" name=""/>
           <p:cNvSpPr txBox="1"/>
           <p:nvPr/>
         </p:nvSpPr>
@@ -9253,7 +9253,7 @@
       </p:sp>
       <p:sp>
         <p:nvSpPr>
-          <p:cNvPr id="1185378455" name=""/>
+          <p:cNvPr id="157814846" name=""/>
           <p:cNvSpPr txBox="1"/>
           <p:nvPr/>
         </p:nvSpPr>
@@ -9536,7 +9536,7 @@
       </p:sp>
       <p:sp>
         <p:nvSpPr>
-          <p:cNvPr id="379884055" name=""/>
+          <p:cNvPr id="337995091" name=""/>
           <p:cNvSpPr txBox="1"/>
           <p:nvPr/>
         </p:nvSpPr>
@@ -9670,7 +9670,7 @@
       </p:sp>
       <p:sp>
         <p:nvSpPr>
-          <p:cNvPr id="546295290" name=""/>
+          <p:cNvPr id="877237543" name=""/>
           <p:cNvSpPr txBox="1"/>
           <p:nvPr/>
         </p:nvSpPr>
@@ -9788,7 +9788,7 @@
       </p:sp>
       <p:cxnSp>
         <p:nvCxnSpPr>
-          <p:cNvPr id="148096610" name=""/>
+          <p:cNvPr id="1314895289" name=""/>
           <p:cNvCxnSpPr/>
           <p:nvPr/>
         </p:nvCxnSpPr>
@@ -9828,7 +9828,7 @@
       </p:cxnSp>
       <p:cxnSp>
         <p:nvCxnSpPr>
-          <p:cNvPr id="892490852" name=""/>
+          <p:cNvPr id="765536761" name=""/>
           <p:cNvCxnSpPr/>
           <p:nvPr/>
         </p:nvCxnSpPr>
@@ -9868,7 +9868,7 @@
       </p:cxnSp>
       <p:cxnSp>
         <p:nvCxnSpPr>
-          <p:cNvPr id="85535781" name=""/>
+          <p:cNvPr id="136143953" name=""/>
           <p:cNvCxnSpPr/>
           <p:nvPr/>
         </p:nvCxnSpPr>
@@ -9908,7 +9908,7 @@
       </p:cxnSp>
       <p:cxnSp>
         <p:nvCxnSpPr>
-          <p:cNvPr id="246593251" name=""/>
+          <p:cNvPr id="1184745029" name=""/>
           <p:cNvCxnSpPr/>
           <p:nvPr/>
         </p:nvCxnSpPr>
@@ -9948,14 +9948,14 @@
       </p:cxnSp>
       <p:sp>
         <p:nvSpPr>
-          <p:cNvPr id="603612651" name=""/>
+          <p:cNvPr id="1093128620" name=""/>
           <p:cNvSpPr txBox="1"/>
           <p:nvPr/>
         </p:nvSpPr>
         <p:spPr bwMode="auto">
           <a:xfrm flipH="0" flipV="0">
-            <a:off x="126460" y="1138158"/>
-            <a:ext cx="2864920" cy="2956919"/>
+            <a:off x="126459" y="1138158"/>
+            <a:ext cx="2866359" cy="2956919"/>
           </a:xfrm>
           <a:prstGeom prst="rect">
             <a:avLst/>
@@ -10047,12 +10047,23 @@
                 <a:ea typeface="Times New Roman"/>
                 <a:cs typeface="Times New Roman"/>
               </a:rPr>
-              <a:t> Le squelette HTML</a:t>
+              <a:t> </a:t>
             </a:r>
             <a:r>
               <a:rPr lang="fr-FR" sz="1200" b="0" i="0" u="none" strike="noStrike" cap="none" spc="0">
                 <a:solidFill>
-                  <a:srgbClr val="000000"/>
+                  <a:srgbClr val="18AB5A"/>
+                </a:solidFill>
+                <a:latin typeface="Times New Roman"/>
+                <a:ea typeface="Times New Roman"/>
+                <a:cs typeface="Times New Roman"/>
+              </a:rPr>
+              <a:t>Le squelette HTML</a:t>
+            </a:r>
+            <a:r>
+              <a:rPr lang="fr-FR" sz="1200" b="0" i="0" u="none" strike="noStrike" cap="none" spc="0">
+                <a:solidFill>
+                  <a:srgbClr val="18AB5A"/>
                 </a:solidFill>
                 <a:latin typeface="Times New Roman"/>
                 <a:ea typeface="Times New Roman"/>
@@ -10090,35 +10101,74 @@
                 <a:ea typeface="Times New Roman"/>
                 <a:cs typeface="Times New Roman"/>
               </a:rPr>
-              <a:t>2 – Le style CS</a:t>
-            </a:r>
-            <a:r>
-              <a:rPr sz="1400" b="1" i="0" u="none">
-                <a:solidFill>
-                  <a:srgbClr val="000000"/>
+              <a:t>2 –</a:t>
+            </a:r>
+            <a:r>
+              <a:rPr lang="fr-FR" sz="1200" b="0" i="0" u="none" strike="noStrike" cap="none" spc="0">
+                <a:solidFill>
+                  <a:srgbClr val="18AB5A"/>
                 </a:solidFill>
                 <a:latin typeface="Times New Roman"/>
                 <a:ea typeface="Times New Roman"/>
                 <a:cs typeface="Times New Roman"/>
               </a:rPr>
-              <a:t>S</a:t>
-            </a:r>
-            <a:endParaRPr sz="1000" b="1"/>
-          </a:p>
-          <a:p>
-            <a:pPr>
-              <a:defRPr/>
-            </a:pPr>
-            <a:r>
-              <a:rPr sz="1200" b="0" i="0" u="none">
-                <a:solidFill>
-                  <a:srgbClr val="000000"/>
-                </a:solidFill>
+              <a:t> </a:t>
+            </a:r>
+            <a:r>
+              <a:rPr lang="fr-FR" sz="1200" b="0" i="0" u="none" strike="noStrike" cap="none" spc="0">
+                <a:solidFill>
+                  <a:srgbClr val="18AB5A"/>
+                </a:solidFill>
+                <a:highlight>
+                  <a:srgbClr val="FFFF00"/>
+                </a:highlight>
                 <a:latin typeface="Times New Roman"/>
                 <a:ea typeface="Times New Roman"/>
                 <a:cs typeface="Times New Roman"/>
               </a:rPr>
-              <a:t>3 – La logique JS</a:t>
+              <a:t>Le style CS</a:t>
+            </a:r>
+            <a:r>
+              <a:rPr sz="1400" b="1" i="0" u="none">
+                <a:solidFill>
+                  <a:srgbClr val="18AB5A"/>
+                </a:solidFill>
+                <a:highlight>
+                  <a:srgbClr val="FFFF00"/>
+                </a:highlight>
+                <a:latin typeface="Times New Roman"/>
+                <a:ea typeface="Times New Roman"/>
+                <a:cs typeface="Times New Roman"/>
+              </a:rPr>
+              <a:t>S</a:t>
+            </a:r>
+            <a:endParaRPr sz="1000" b="1"/>
+          </a:p>
+          <a:p>
+            <a:pPr>
+              <a:defRPr/>
+            </a:pPr>
+            <a:r>
+              <a:rPr sz="1200" b="0" i="0" u="none">
+                <a:solidFill>
+                  <a:srgbClr val="000000"/>
+                </a:solidFill>
+                <a:latin typeface="Times New Roman"/>
+                <a:ea typeface="Times New Roman"/>
+                <a:cs typeface="Times New Roman"/>
+              </a:rPr>
+              <a:t>3 – </a:t>
+            </a:r>
+            <a:r>
+              <a:rPr sz="1200" b="0" i="0" u="none">
+                <a:solidFill>
+                  <a:srgbClr val="000ABF"/>
+                </a:solidFill>
+                <a:latin typeface="Times New Roman"/>
+                <a:ea typeface="Times New Roman"/>
+                <a:cs typeface="Times New Roman"/>
+              </a:rPr>
+              <a:t>La logique JS</a:t>
             </a:r>
             <a:endParaRPr sz="1000" b="1"/>
           </a:p>
@@ -10336,7 +10386,7 @@
       </p:grpSpPr>
       <p:sp>
         <p:nvSpPr>
-          <p:cNvPr id="369924939" name="Title 1"/>
+          <p:cNvPr id="554828022" name="Title 1"/>
           <p:cNvSpPr>
             <a:spLocks noGrp="1"/>
           </p:cNvSpPr>
@@ -10379,7 +10429,7 @@
       </p:sp>
       <p:sp>
         <p:nvSpPr>
-          <p:cNvPr id="1483590963" name="Zone de texte 1838115843"/>
+          <p:cNvPr id="565585680" name="Zone de texte 1838115843"/>
           <p:cNvSpPr txBox="1"/>
           <p:nvPr/>
         </p:nvSpPr>
@@ -10525,7 +10575,7 @@
       </p:sp>
       <p:sp>
         <p:nvSpPr>
-          <p:cNvPr id="1651459732" name="Zone de texte 5"/>
+          <p:cNvPr id="964076864" name="Zone de texte 5"/>
           <p:cNvSpPr txBox="1"/>
           <p:nvPr/>
         </p:nvSpPr>
@@ -10559,7 +10609,7 @@
       </p:sp>
       <p:sp>
         <p:nvSpPr>
-          <p:cNvPr id="1745131881" name="Subtitle 2"/>
+          <p:cNvPr id="718386446" name="Subtitle 2"/>
           <p:cNvSpPr>
             <a:spLocks noGrp="1"/>
           </p:cNvSpPr>
@@ -10805,7 +10855,7 @@
       </p:sp>
       <p:sp>
         <p:nvSpPr>
-          <p:cNvPr id="152846873" name="Zone de texte 5"/>
+          <p:cNvPr id="1612266423" name="Zone de texte 5"/>
           <p:cNvSpPr txBox="1"/>
           <p:nvPr/>
         </p:nvSpPr>
@@ -10976,7 +11026,7 @@
       </p:sp>
       <p:sp>
         <p:nvSpPr>
-          <p:cNvPr id="228632596" name="Zone de texte 5"/>
+          <p:cNvPr id="339825928" name="Zone de texte 5"/>
           <p:cNvSpPr txBox="1"/>
           <p:nvPr/>
         </p:nvSpPr>
@@ -11016,7 +11066,7 @@
       </p:sp>
       <p:sp>
         <p:nvSpPr>
-          <p:cNvPr id="2140187911" name="Zone de texte 5"/>
+          <p:cNvPr id="1925986785" name="Zone de texte 5"/>
           <p:cNvSpPr txBox="1"/>
           <p:nvPr/>
         </p:nvSpPr>
@@ -11056,7 +11106,7 @@
       </p:sp>
       <p:sp>
         <p:nvSpPr>
-          <p:cNvPr id="1119876784" name=""/>
+          <p:cNvPr id="1060213131" name=""/>
           <p:cNvSpPr txBox="1"/>
           <p:nvPr/>
         </p:nvSpPr>
@@ -11084,7 +11134,7 @@
       </p:sp>
       <p:sp>
         <p:nvSpPr>
-          <p:cNvPr id="1441662309" name="Subtitle 2"/>
+          <p:cNvPr id="1513059835" name="Subtitle 2"/>
           <p:cNvSpPr>
             <a:spLocks noGrp="1"/>
           </p:cNvSpPr>
@@ -11307,7 +11357,7 @@
       </p:sp>
       <p:sp>
         <p:nvSpPr>
-          <p:cNvPr id="603223221" name="Zone de texte 5"/>
+          <p:cNvPr id="2126166434" name="Zone de texte 5"/>
           <p:cNvSpPr txBox="1"/>
           <p:nvPr/>
         </p:nvSpPr>
@@ -11351,7 +11401,7 @@
       </p:sp>
       <p:sp>
         <p:nvSpPr>
-          <p:cNvPr id="1941621122" name=""/>
+          <p:cNvPr id="662039046" name=""/>
           <p:cNvSpPr/>
           <p:nvPr/>
         </p:nvSpPr>
@@ -11386,7 +11436,7 @@
       </p:sp>
       <p:sp>
         <p:nvSpPr>
-          <p:cNvPr id="1200161635" name=""/>
+          <p:cNvPr id="1889563956" name=""/>
           <p:cNvSpPr/>
           <p:nvPr/>
         </p:nvSpPr>
@@ -11424,7 +11474,7 @@
       </p:sp>
       <p:sp>
         <p:nvSpPr>
-          <p:cNvPr id="2036024506" name=""/>
+          <p:cNvPr id="1501831634" name=""/>
           <p:cNvSpPr txBox="1"/>
           <p:nvPr/>
         </p:nvSpPr>
@@ -11497,7 +11547,7 @@
       </p:grpSpPr>
       <p:sp>
         <p:nvSpPr>
-          <p:cNvPr id="996687290" name="Title 1"/>
+          <p:cNvPr id="491050974" name="Title 1"/>
           <p:cNvSpPr>
             <a:spLocks noGrp="1"/>
           </p:cNvSpPr>
@@ -11543,7 +11593,7 @@
       </p:sp>
       <p:sp>
         <p:nvSpPr>
-          <p:cNvPr id="1283589098" name="Subtitle 2"/>
+          <p:cNvPr id="456875440" name="Subtitle 2"/>
           <p:cNvSpPr>
             <a:spLocks noGrp="1"/>
           </p:cNvSpPr>
@@ -11648,7 +11698,7 @@
       </p:sp>
       <p:sp>
         <p:nvSpPr>
-          <p:cNvPr id="848402156" name="Subtitle 2"/>
+          <p:cNvPr id="178099521" name="Subtitle 2"/>
           <p:cNvSpPr>
             <a:spLocks noGrp="1"/>
           </p:cNvSpPr>
@@ -11916,7 +11966,7 @@
       </p:sp>
       <p:sp>
         <p:nvSpPr>
-          <p:cNvPr id="158578147" name="Subtitle 2"/>
+          <p:cNvPr id="645783701" name="Subtitle 2"/>
           <p:cNvSpPr>
             <a:spLocks noGrp="1"/>
           </p:cNvSpPr>
@@ -12184,7 +12234,7 @@
       </p:sp>
       <p:sp>
         <p:nvSpPr>
-          <p:cNvPr id="1297606004" name="Zone de texte 1838115843"/>
+          <p:cNvPr id="360547673" name="Zone de texte 1838115843"/>
           <p:cNvSpPr txBox="1"/>
           <p:nvPr/>
         </p:nvSpPr>
@@ -12292,7 +12342,7 @@
       </p:sp>
       <p:sp>
         <p:nvSpPr>
-          <p:cNvPr id="88171566" name="Zone de texte 4"/>
+          <p:cNvPr id="751448771" name="Zone de texte 4"/>
           <p:cNvSpPr txBox="1"/>
           <p:nvPr/>
         </p:nvSpPr>
@@ -12326,7 +12376,7 @@
       </p:sp>
       <p:sp>
         <p:nvSpPr>
-          <p:cNvPr id="184544197" name="Zone de texte 5"/>
+          <p:cNvPr id="189526024" name="Zone de texte 5"/>
           <p:cNvSpPr txBox="1"/>
           <p:nvPr/>
         </p:nvSpPr>
@@ -12360,7 +12410,7 @@
       </p:sp>
       <p:sp>
         <p:nvSpPr>
-          <p:cNvPr id="1255559112" name="Zone de texte 5"/>
+          <p:cNvPr id="519395861" name="Zone de texte 5"/>
           <p:cNvSpPr txBox="1"/>
           <p:nvPr/>
         </p:nvSpPr>
@@ -12426,7 +12476,7 @@
       </p:sp>
       <p:sp>
         <p:nvSpPr>
-          <p:cNvPr id="513695786" name="Zone de texte 5"/>
+          <p:cNvPr id="1776366769" name="Zone de texte 5"/>
           <p:cNvSpPr txBox="1"/>
           <p:nvPr/>
         </p:nvSpPr>
@@ -12460,7 +12510,7 @@
       </p:sp>
       <p:sp>
         <p:nvSpPr>
-          <p:cNvPr id="1484477496" name="Subtitle 2"/>
+          <p:cNvPr id="1290015799" name="Subtitle 2"/>
           <p:cNvSpPr>
             <a:spLocks noGrp="1"/>
           </p:cNvSpPr>
@@ -12731,7 +12781,7 @@
       </p:sp>
       <p:sp>
         <p:nvSpPr>
-          <p:cNvPr id="694704423" name="Subtitle 2"/>
+          <p:cNvPr id="2039485555" name="Subtitle 2"/>
           <p:cNvSpPr>
             <a:spLocks noGrp="1"/>
           </p:cNvSpPr>
@@ -12999,7 +13049,7 @@
       </p:sp>
       <p:sp>
         <p:nvSpPr>
-          <p:cNvPr id="1403401869" name=""/>
+          <p:cNvPr id="1306400841" name=""/>
           <p:cNvSpPr/>
           <p:nvPr/>
         </p:nvSpPr>
@@ -13034,7 +13084,7 @@
       </p:sp>
       <p:sp>
         <p:nvSpPr>
-          <p:cNvPr id="2086529230" name=""/>
+          <p:cNvPr id="275494167" name=""/>
           <p:cNvSpPr/>
           <p:nvPr/>
         </p:nvSpPr>
@@ -13072,7 +13122,7 @@
       </p:sp>
       <p:sp>
         <p:nvSpPr>
-          <p:cNvPr id="1928711246" name=""/>
+          <p:cNvPr id="63516171" name=""/>
           <p:cNvSpPr txBox="1"/>
           <p:nvPr/>
         </p:nvSpPr>
@@ -13145,7 +13195,7 @@
       </p:grpSpPr>
       <p:sp>
         <p:nvSpPr>
-          <p:cNvPr id="386769461" name="Title 1"/>
+          <p:cNvPr id="251652587" name="Title 1"/>
           <p:cNvSpPr>
             <a:spLocks noGrp="1"/>
           </p:cNvSpPr>
@@ -13191,7 +13241,7 @@
       </p:sp>
       <p:sp>
         <p:nvSpPr>
-          <p:cNvPr id="1462313749" name="Subtitle 2"/>
+          <p:cNvPr id="731382740" name="Subtitle 2"/>
           <p:cNvSpPr>
             <a:spLocks noGrp="1"/>
           </p:cNvSpPr>
@@ -13296,7 +13346,7 @@
       </p:sp>
       <p:sp>
         <p:nvSpPr>
-          <p:cNvPr id="116014207" name="Subtitle 2"/>
+          <p:cNvPr id="1179723513" name="Subtitle 2"/>
           <p:cNvSpPr>
             <a:spLocks noGrp="1"/>
           </p:cNvSpPr>
@@ -13564,7 +13614,7 @@
       </p:sp>
       <p:sp>
         <p:nvSpPr>
-          <p:cNvPr id="135196571" name="Subtitle 2"/>
+          <p:cNvPr id="354443590" name="Subtitle 2"/>
           <p:cNvSpPr>
             <a:spLocks noGrp="1"/>
           </p:cNvSpPr>
@@ -13832,7 +13882,7 @@
       </p:sp>
       <p:sp>
         <p:nvSpPr>
-          <p:cNvPr id="1008327643" name="Zone de texte 1838115843"/>
+          <p:cNvPr id="122570900" name="Zone de texte 1838115843"/>
           <p:cNvSpPr txBox="1"/>
           <p:nvPr/>
         </p:nvSpPr>
@@ -13940,7 +13990,7 @@
       </p:sp>
       <p:sp>
         <p:nvSpPr>
-          <p:cNvPr id="431510655" name="Zone de texte 4"/>
+          <p:cNvPr id="974621280" name="Zone de texte 4"/>
           <p:cNvSpPr txBox="1"/>
           <p:nvPr/>
         </p:nvSpPr>
@@ -13974,7 +14024,7 @@
       </p:sp>
       <p:sp>
         <p:nvSpPr>
-          <p:cNvPr id="1075354066" name="Zone de texte 5"/>
+          <p:cNvPr id="1783900192" name="Zone de texte 5"/>
           <p:cNvSpPr txBox="1"/>
           <p:nvPr/>
         </p:nvSpPr>
@@ -14008,7 +14058,7 @@
       </p:sp>
       <p:sp>
         <p:nvSpPr>
-          <p:cNvPr id="1709400916" name="Zone de texte 5"/>
+          <p:cNvPr id="914909869" name="Zone de texte 5"/>
           <p:cNvSpPr txBox="1"/>
           <p:nvPr/>
         </p:nvSpPr>
@@ -14072,7 +14122,7 @@
       </p:sp>
       <p:sp>
         <p:nvSpPr>
-          <p:cNvPr id="1479127772" name="Zone de texte 5"/>
+          <p:cNvPr id="83700311" name="Zone de texte 5"/>
           <p:cNvSpPr txBox="1"/>
           <p:nvPr/>
         </p:nvSpPr>
@@ -14106,7 +14156,7 @@
       </p:sp>
       <p:sp>
         <p:nvSpPr>
-          <p:cNvPr id="289527549" name="Subtitle 2"/>
+          <p:cNvPr id="562245464" name="Subtitle 2"/>
           <p:cNvSpPr>
             <a:spLocks noGrp="1"/>
           </p:cNvSpPr>
@@ -14377,7 +14427,7 @@
       </p:sp>
       <p:sp>
         <p:nvSpPr>
-          <p:cNvPr id="1203866737" name="Subtitle 2"/>
+          <p:cNvPr id="821114036" name="Subtitle 2"/>
           <p:cNvSpPr>
             <a:spLocks noGrp="1"/>
           </p:cNvSpPr>
@@ -14645,7 +14695,7 @@
       </p:sp>
       <p:sp>
         <p:nvSpPr>
-          <p:cNvPr id="310583196" name=""/>
+          <p:cNvPr id="1317822182" name=""/>
           <p:cNvSpPr/>
           <p:nvPr/>
         </p:nvSpPr>
@@ -14680,7 +14730,7 @@
       </p:sp>
       <p:sp>
         <p:nvSpPr>
-          <p:cNvPr id="83008596" name=""/>
+          <p:cNvPr id="1654218662" name=""/>
           <p:cNvSpPr/>
           <p:nvPr/>
         </p:nvSpPr>
@@ -14718,7 +14768,7 @@
       </p:sp>
       <p:sp>
         <p:nvSpPr>
-          <p:cNvPr id="513207232" name=""/>
+          <p:cNvPr id="905087108" name=""/>
           <p:cNvSpPr txBox="1"/>
           <p:nvPr/>
         </p:nvSpPr>
@@ -14791,7 +14841,7 @@
       </p:grpSpPr>
       <p:sp>
         <p:nvSpPr>
-          <p:cNvPr id="1444357172" name="Title 1"/>
+          <p:cNvPr id="1553201102" name="Title 1"/>
           <p:cNvSpPr>
             <a:spLocks noGrp="1"/>
           </p:cNvSpPr>
@@ -14834,7 +14884,7 @@
       </p:sp>
       <p:sp>
         <p:nvSpPr>
-          <p:cNvPr id="942024204" name="Zone de texte 1838115843"/>
+          <p:cNvPr id="1167285119" name="Zone de texte 1838115843"/>
           <p:cNvSpPr txBox="1"/>
           <p:nvPr/>
         </p:nvSpPr>
@@ -14956,7 +15006,7 @@
       </p:sp>
       <p:sp>
         <p:nvSpPr>
-          <p:cNvPr id="1026572690" name="Zone de texte 5"/>
+          <p:cNvPr id="146119350" name="Zone de texte 5"/>
           <p:cNvSpPr txBox="1"/>
           <p:nvPr/>
         </p:nvSpPr>
@@ -14990,7 +15040,7 @@
       </p:sp>
       <p:sp>
         <p:nvSpPr>
-          <p:cNvPr id="1870945663" name="Subtitle 2"/>
+          <p:cNvPr id="379860671" name="Subtitle 2"/>
           <p:cNvSpPr>
             <a:spLocks noGrp="1"/>
           </p:cNvSpPr>
@@ -15236,7 +15286,7 @@
       </p:sp>
       <p:sp>
         <p:nvSpPr>
-          <p:cNvPr id="705914987" name="Zone de texte 5"/>
+          <p:cNvPr id="1891656845" name="Zone de texte 5"/>
           <p:cNvSpPr txBox="1"/>
           <p:nvPr/>
         </p:nvSpPr>
@@ -15407,7 +15457,7 @@
       </p:sp>
       <p:sp>
         <p:nvSpPr>
-          <p:cNvPr id="794047275" name="Zone de texte 5"/>
+          <p:cNvPr id="1224735239" name="Zone de texte 5"/>
           <p:cNvSpPr txBox="1"/>
           <p:nvPr/>
         </p:nvSpPr>
@@ -15447,7 +15497,7 @@
       </p:sp>
       <p:sp>
         <p:nvSpPr>
-          <p:cNvPr id="73446259" name="Zone de texte 5"/>
+          <p:cNvPr id="507503180" name="Zone de texte 5"/>
           <p:cNvSpPr txBox="1"/>
           <p:nvPr/>
         </p:nvSpPr>
@@ -15487,7 +15537,7 @@
       </p:sp>
       <p:sp>
         <p:nvSpPr>
-          <p:cNvPr id="1694610788" name=""/>
+          <p:cNvPr id="1823215561" name=""/>
           <p:cNvSpPr txBox="1"/>
           <p:nvPr/>
         </p:nvSpPr>
@@ -15515,7 +15565,7 @@
       </p:sp>
       <p:sp>
         <p:nvSpPr>
-          <p:cNvPr id="493464758" name="Subtitle 2"/>
+          <p:cNvPr id="1524969215" name="Subtitle 2"/>
           <p:cNvSpPr>
             <a:spLocks noGrp="1"/>
           </p:cNvSpPr>
@@ -15738,7 +15788,7 @@
       </p:sp>
       <p:sp>
         <p:nvSpPr>
-          <p:cNvPr id="1443814926" name="Zone de texte 5"/>
+          <p:cNvPr id="574775405" name="Zone de texte 5"/>
           <p:cNvSpPr txBox="1"/>
           <p:nvPr/>
         </p:nvSpPr>
@@ -15794,7 +15844,7 @@
       </p:sp>
       <p:sp>
         <p:nvSpPr>
-          <p:cNvPr id="1296315035" name="Zone de texte 5"/>
+          <p:cNvPr id="296879519" name="Zone de texte 5"/>
           <p:cNvSpPr txBox="1"/>
           <p:nvPr/>
         </p:nvSpPr>
@@ -15836,7 +15886,7 @@
       </p:sp>
       <p:sp>
         <p:nvSpPr>
-          <p:cNvPr id="754625025" name=""/>
+          <p:cNvPr id="508306575" name=""/>
           <p:cNvSpPr/>
           <p:nvPr/>
         </p:nvSpPr>
@@ -15871,7 +15921,7 @@
       </p:sp>
       <p:sp>
         <p:nvSpPr>
-          <p:cNvPr id="79817209" name=""/>
+          <p:cNvPr id="777283123" name=""/>
           <p:cNvSpPr/>
           <p:nvPr/>
         </p:nvSpPr>
@@ -15909,7 +15959,7 @@
       </p:sp>
       <p:sp>
         <p:nvSpPr>
-          <p:cNvPr id="936803714" name=""/>
+          <p:cNvPr id="188370916" name=""/>
           <p:cNvSpPr txBox="1"/>
           <p:nvPr/>
         </p:nvSpPr>
@@ -15982,7 +16032,7 @@
       </p:grpSpPr>
       <p:sp>
         <p:nvSpPr>
-          <p:cNvPr id="921705889" name="Title 1"/>
+          <p:cNvPr id="1814320756" name="Title 1"/>
           <p:cNvSpPr>
             <a:spLocks noGrp="1"/>
           </p:cNvSpPr>
@@ -16025,7 +16075,7 @@
       </p:sp>
       <p:sp>
         <p:nvSpPr>
-          <p:cNvPr id="1124086763" name="Subtitle 2"/>
+          <p:cNvPr id="1689129755" name="Subtitle 2"/>
           <p:cNvSpPr>
             <a:spLocks noGrp="1"/>
           </p:cNvSpPr>
@@ -16130,7 +16180,7 @@
       </p:sp>
       <p:sp>
         <p:nvSpPr>
-          <p:cNvPr id="263675407" name="Subtitle 2"/>
+          <p:cNvPr id="1548301398" name="Subtitle 2"/>
           <p:cNvSpPr>
             <a:spLocks noGrp="1"/>
           </p:cNvSpPr>
@@ -16398,7 +16448,7 @@
       </p:sp>
       <p:sp>
         <p:nvSpPr>
-          <p:cNvPr id="2043461590" name="Subtitle 2"/>
+          <p:cNvPr id="1748120980" name="Subtitle 2"/>
           <p:cNvSpPr>
             <a:spLocks noGrp="1"/>
           </p:cNvSpPr>
@@ -16666,7 +16716,7 @@
       </p:sp>
       <p:sp>
         <p:nvSpPr>
-          <p:cNvPr id="875858999" name="Zone de texte 1838115843"/>
+          <p:cNvPr id="739221093" name="Zone de texte 1838115843"/>
           <p:cNvSpPr txBox="1"/>
           <p:nvPr/>
         </p:nvSpPr>
@@ -16780,7 +16830,7 @@
       </p:sp>
       <p:sp>
         <p:nvSpPr>
-          <p:cNvPr id="1941713755" name="Zone de texte 4"/>
+          <p:cNvPr id="2013562827" name="Zone de texte 4"/>
           <p:cNvSpPr txBox="1"/>
           <p:nvPr/>
         </p:nvSpPr>
@@ -16814,7 +16864,7 @@
       </p:sp>
       <p:sp>
         <p:nvSpPr>
-          <p:cNvPr id="299271613" name="Zone de texte 5"/>
+          <p:cNvPr id="882444955" name="Zone de texte 5"/>
           <p:cNvSpPr txBox="1"/>
           <p:nvPr/>
         </p:nvSpPr>
@@ -16848,7 +16898,7 @@
       </p:sp>
       <p:sp>
         <p:nvSpPr>
-          <p:cNvPr id="1323586598" name="Zone de texte 5"/>
+          <p:cNvPr id="1743896788" name="Zone de texte 5"/>
           <p:cNvSpPr txBox="1"/>
           <p:nvPr/>
         </p:nvSpPr>
@@ -16916,7 +16966,7 @@
       </p:sp>
       <p:sp>
         <p:nvSpPr>
-          <p:cNvPr id="223546748" name="Zone de texte 5"/>
+          <p:cNvPr id="674327125" name="Zone de texte 5"/>
           <p:cNvSpPr txBox="1"/>
           <p:nvPr/>
         </p:nvSpPr>
@@ -16950,7 +17000,7 @@
       </p:sp>
       <p:sp>
         <p:nvSpPr>
-          <p:cNvPr id="657621644" name="Zone de texte 5"/>
+          <p:cNvPr id="1828429227" name="Zone de texte 5"/>
           <p:cNvSpPr txBox="1"/>
           <p:nvPr/>
         </p:nvSpPr>
@@ -16984,7 +17034,7 @@
       </p:sp>
       <p:sp>
         <p:nvSpPr>
-          <p:cNvPr id="1886819691" name=""/>
+          <p:cNvPr id="1985315690" name=""/>
           <p:cNvSpPr/>
           <p:nvPr/>
         </p:nvSpPr>
@@ -17019,7 +17069,7 @@
       </p:sp>
       <p:sp>
         <p:nvSpPr>
-          <p:cNvPr id="1842438347" name=""/>
+          <p:cNvPr id="1195956224" name=""/>
           <p:cNvSpPr/>
           <p:nvPr/>
         </p:nvSpPr>
@@ -17057,7 +17107,7 @@
       </p:sp>
       <p:sp>
         <p:nvSpPr>
-          <p:cNvPr id="246105634" name=""/>
+          <p:cNvPr id="243269391" name=""/>
           <p:cNvSpPr txBox="1"/>
           <p:nvPr/>
         </p:nvSpPr>
@@ -17130,7 +17180,7 @@
       </p:grpSpPr>
       <p:sp>
         <p:nvSpPr>
-          <p:cNvPr id="1716638967" name="Title 1"/>
+          <p:cNvPr id="219245216" name="Title 1"/>
           <p:cNvSpPr>
             <a:spLocks noGrp="1"/>
           </p:cNvSpPr>
@@ -17173,7 +17223,7 @@
       </p:sp>
       <p:sp>
         <p:nvSpPr>
-          <p:cNvPr id="708852853" name="Subtitle 2"/>
+          <p:cNvPr id="289566848" name="Subtitle 2"/>
           <p:cNvSpPr>
             <a:spLocks noGrp="1"/>
           </p:cNvSpPr>
@@ -17220,7 +17270,7 @@
       </p:sp>
       <p:sp>
         <p:nvSpPr>
-          <p:cNvPr id="1426851333" name="Zone de texte 1838115843"/>
+          <p:cNvPr id="49443084" name="Zone de texte 1838115843"/>
           <p:cNvSpPr txBox="1"/>
           <p:nvPr/>
         </p:nvSpPr>
@@ -17324,7 +17374,7 @@
       </p:sp>
       <p:sp>
         <p:nvSpPr>
-          <p:cNvPr id="1146657789" name=""/>
+          <p:cNvPr id="1459430121" name=""/>
           <p:cNvSpPr txBox="1"/>
           <p:nvPr/>
         </p:nvSpPr>

</xml_diff>

<commit_message>
commit 20250714 _ ajout score _balise ds index _ incrementation des points JS-DOM
</commit_message>
<xml_diff>
--- a/0_doc/RessouMaquette.pptx
+++ b/0_doc/RessouMaquette.pptx
@@ -143,7 +143,7 @@
       </p:grpSpPr>
       <p:sp>
         <p:nvSpPr>
-          <p:cNvPr id="965115799" name="Espace réservé d'en-tête 1"/>
+          <p:cNvPr id="1120707376" name="Espace réservé d'en-tête 1"/>
           <p:cNvSpPr>
             <a:spLocks noGrp="1"/>
           </p:cNvSpPr>
@@ -177,7 +177,7 @@
       </p:sp>
       <p:sp>
         <p:nvSpPr>
-          <p:cNvPr id="1830470532" name="Espace réservé pour la date 2"/>
+          <p:cNvPr id="974254042" name="Espace réservé pour la date 2"/>
           <p:cNvSpPr>
             <a:spLocks noGrp="1"/>
           </p:cNvSpPr>
@@ -215,7 +215,7 @@
       </p:sp>
       <p:sp>
         <p:nvSpPr>
-          <p:cNvPr id="1254058104" name="Espace réservé pour l'image de la diapositive 3"/>
+          <p:cNvPr id="1541484147" name="Espace réservé pour l'image de la diapositive 3"/>
           <p:cNvSpPr>
             <a:spLocks noChangeAspect="1" noGrp="1" noRot="1"/>
           </p:cNvSpPr>
@@ -251,7 +251,7 @@
       </p:sp>
       <p:sp>
         <p:nvSpPr>
-          <p:cNvPr id="288398945" name="Remarques Espace réservé 4"/>
+          <p:cNvPr id="178571628" name="Remarques Espace réservé 4"/>
           <p:cNvSpPr>
             <a:spLocks noGrp="1"/>
           </p:cNvSpPr>
@@ -325,7 +325,7 @@
       </p:sp>
       <p:sp>
         <p:nvSpPr>
-          <p:cNvPr id="1878503034" name="Espace réservé du pied de page 5"/>
+          <p:cNvPr id="1571136114" name="Espace réservé du pied de page 5"/>
           <p:cNvSpPr>
             <a:spLocks noGrp="1"/>
           </p:cNvSpPr>
@@ -359,7 +359,7 @@
       </p:sp>
       <p:sp>
         <p:nvSpPr>
-          <p:cNvPr id="101034443" name="Espace réservé du numéro de diapositive 6"/>
+          <p:cNvPr id="1506431450" name="Espace réservé du numéro de diapositive 6"/>
           <p:cNvSpPr>
             <a:spLocks noGrp="1"/>
           </p:cNvSpPr>
@@ -512,7 +512,7 @@
       </p:grpSpPr>
       <p:sp>
         <p:nvSpPr>
-          <p:cNvPr id="2108495589" name="Slide Image Placeholder 1"/>
+          <p:cNvPr id="1876657096" name="Slide Image Placeholder 1"/>
           <p:cNvSpPr>
             <a:spLocks noChangeAspect="1" noGrp="1" noRot="1"/>
           </p:cNvSpPr>
@@ -524,7 +524,7 @@
       </p:sp>
       <p:sp>
         <p:nvSpPr>
-          <p:cNvPr id="1962601459" name="Notes Placeholder 2"/>
+          <p:cNvPr id="1993656688" name="Notes Placeholder 2"/>
           <p:cNvSpPr>
             <a:spLocks noGrp="1"/>
           </p:cNvSpPr>
@@ -546,7 +546,7 @@
       </p:sp>
       <p:sp>
         <p:nvSpPr>
-          <p:cNvPr id="1017756731" name="Slide Number Placeholder 3"/>
+          <p:cNvPr id="624407048" name="Slide Number Placeholder 3"/>
           <p:cNvSpPr>
             <a:spLocks noGrp="1"/>
           </p:cNvSpPr>
@@ -594,7 +594,7 @@
       </p:grpSpPr>
       <p:sp>
         <p:nvSpPr>
-          <p:cNvPr id="108088707" name="Espace réservé pour l'image de la diapositive 1"/>
+          <p:cNvPr id="901335281" name="Espace réservé pour l'image de la diapositive 1"/>
           <p:cNvSpPr>
             <a:spLocks noChangeAspect="1" noGrp="1" noRot="1"/>
           </p:cNvSpPr>
@@ -611,7 +611,7 @@
       </p:sp>
       <p:sp>
         <p:nvSpPr>
-          <p:cNvPr id="1113447222" name="Remarques Espace réservé 2"/>
+          <p:cNvPr id="821287254" name="Remarques Espace réservé 2"/>
           <p:cNvSpPr>
             <a:spLocks noGrp="1"/>
           </p:cNvSpPr>
@@ -636,7 +636,7 @@
       </p:sp>
       <p:sp>
         <p:nvSpPr>
-          <p:cNvPr id="482024383" name="Espace réservé pour le numéro de diapositive 3"/>
+          <p:cNvPr id="1090556776" name="Espace réservé pour le numéro de diapositive 3"/>
           <p:cNvSpPr>
             <a:spLocks noGrp="1"/>
           </p:cNvSpPr>
@@ -684,7 +684,7 @@
       </p:grpSpPr>
       <p:sp>
         <p:nvSpPr>
-          <p:cNvPr id="1075552342" name="Slide Image Placeholder 1"/>
+          <p:cNvPr id="2119622175" name="Slide Image Placeholder 1"/>
           <p:cNvSpPr>
             <a:spLocks noChangeAspect="1" noGrp="1" noRot="1"/>
           </p:cNvSpPr>
@@ -696,7 +696,7 @@
       </p:sp>
       <p:sp>
         <p:nvSpPr>
-          <p:cNvPr id="1384680888" name="Notes Placeholder 2"/>
+          <p:cNvPr id="177754706" name="Notes Placeholder 2"/>
           <p:cNvSpPr>
             <a:spLocks noGrp="1"/>
           </p:cNvSpPr>
@@ -718,7 +718,7 @@
       </p:sp>
       <p:sp>
         <p:nvSpPr>
-          <p:cNvPr id="345943879" name="Slide Number Placeholder 3"/>
+          <p:cNvPr id="2013850311" name="Slide Number Placeholder 3"/>
           <p:cNvSpPr>
             <a:spLocks noGrp="1"/>
           </p:cNvSpPr>
@@ -766,7 +766,7 @@
       </p:grpSpPr>
       <p:sp>
         <p:nvSpPr>
-          <p:cNvPr id="60289264" name="Slide Image Placeholder 1"/>
+          <p:cNvPr id="96953602" name="Slide Image Placeholder 1"/>
           <p:cNvSpPr>
             <a:spLocks noChangeAspect="1" noGrp="1" noRot="1"/>
           </p:cNvSpPr>
@@ -778,7 +778,7 @@
       </p:sp>
       <p:sp>
         <p:nvSpPr>
-          <p:cNvPr id="1727576249" name="Notes Placeholder 2"/>
+          <p:cNvPr id="1353801093" name="Notes Placeholder 2"/>
           <p:cNvSpPr>
             <a:spLocks noGrp="1"/>
           </p:cNvSpPr>
@@ -800,7 +800,7 @@
       </p:sp>
       <p:sp>
         <p:nvSpPr>
-          <p:cNvPr id="1711050164" name="Slide Number Placeholder 3"/>
+          <p:cNvPr id="165256689" name="Slide Number Placeholder 3"/>
           <p:cNvSpPr>
             <a:spLocks noGrp="1"/>
           </p:cNvSpPr>
@@ -930,7 +930,7 @@
       </p:grpSpPr>
       <p:sp>
         <p:nvSpPr>
-          <p:cNvPr id="121874147" name="Espace réservé pour l'image de la diapositive 1"/>
+          <p:cNvPr id="1491448653" name="Espace réservé pour l'image de la diapositive 1"/>
           <p:cNvSpPr>
             <a:spLocks noChangeAspect="1" noGrp="1" noRot="1"/>
           </p:cNvSpPr>
@@ -947,7 +947,7 @@
       </p:sp>
       <p:sp>
         <p:nvSpPr>
-          <p:cNvPr id="1161128674" name="Remarques Espace réservé 2"/>
+          <p:cNvPr id="1999682089" name="Remarques Espace réservé 2"/>
           <p:cNvSpPr>
             <a:spLocks noGrp="1"/>
           </p:cNvSpPr>
@@ -972,7 +972,7 @@
       </p:sp>
       <p:sp>
         <p:nvSpPr>
-          <p:cNvPr id="1926414074" name="Espace réservé pour le numéro de diapositive 3"/>
+          <p:cNvPr id="1467004249" name="Espace réservé pour le numéro de diapositive 3"/>
           <p:cNvSpPr>
             <a:spLocks noGrp="1"/>
           </p:cNvSpPr>
@@ -1020,7 +1020,7 @@
       </p:grpSpPr>
       <p:sp>
         <p:nvSpPr>
-          <p:cNvPr id="1246871207" name="Espace réservé pour l'image de la diapositive 1"/>
+          <p:cNvPr id="1779067736" name="Espace réservé pour l'image de la diapositive 1"/>
           <p:cNvSpPr>
             <a:spLocks noChangeAspect="1" noGrp="1" noRot="1"/>
           </p:cNvSpPr>
@@ -1037,7 +1037,7 @@
       </p:sp>
       <p:sp>
         <p:nvSpPr>
-          <p:cNvPr id="261358912" name="Remarques Espace réservé 2"/>
+          <p:cNvPr id="448172660" name="Remarques Espace réservé 2"/>
           <p:cNvSpPr>
             <a:spLocks noGrp="1"/>
           </p:cNvSpPr>
@@ -1062,7 +1062,7 @@
       </p:sp>
       <p:sp>
         <p:nvSpPr>
-          <p:cNvPr id="1379339520" name="Espace réservé pour le numéro de diapositive 3"/>
+          <p:cNvPr id="583172361" name="Espace réservé pour le numéro de diapositive 3"/>
           <p:cNvSpPr>
             <a:spLocks noGrp="1"/>
           </p:cNvSpPr>
@@ -1110,7 +1110,7 @@
       </p:grpSpPr>
       <p:sp>
         <p:nvSpPr>
-          <p:cNvPr id="1982949640" name="Espace réservé pour l'image de la diapositive 1"/>
+          <p:cNvPr id="464471483" name="Espace réservé pour l'image de la diapositive 1"/>
           <p:cNvSpPr>
             <a:spLocks noChangeAspect="1" noGrp="1" noRot="1"/>
           </p:cNvSpPr>
@@ -1127,7 +1127,7 @@
       </p:sp>
       <p:sp>
         <p:nvSpPr>
-          <p:cNvPr id="1684640980" name="Remarques Espace réservé 2"/>
+          <p:cNvPr id="2144574740" name="Remarques Espace réservé 2"/>
           <p:cNvSpPr>
             <a:spLocks noGrp="1"/>
           </p:cNvSpPr>
@@ -1152,7 +1152,7 @@
       </p:sp>
       <p:sp>
         <p:nvSpPr>
-          <p:cNvPr id="554444597" name="Espace réservé pour le numéro de diapositive 3"/>
+          <p:cNvPr id="1803182514" name="Espace réservé pour le numéro de diapositive 3"/>
           <p:cNvSpPr>
             <a:spLocks noGrp="1"/>
           </p:cNvSpPr>
@@ -1200,7 +1200,7 @@
       </p:grpSpPr>
       <p:sp>
         <p:nvSpPr>
-          <p:cNvPr id="1843089997" name="Espace réservé pour l'image de la diapositive 1"/>
+          <p:cNvPr id="1111297423" name="Espace réservé pour l'image de la diapositive 1"/>
           <p:cNvSpPr>
             <a:spLocks noChangeAspect="1" noGrp="1" noRot="1"/>
           </p:cNvSpPr>
@@ -1217,7 +1217,7 @@
       </p:sp>
       <p:sp>
         <p:nvSpPr>
-          <p:cNvPr id="1237345684" name="Remarques Espace réservé 2"/>
+          <p:cNvPr id="1707920959" name="Remarques Espace réservé 2"/>
           <p:cNvSpPr>
             <a:spLocks noGrp="1"/>
           </p:cNvSpPr>
@@ -1242,7 +1242,7 @@
       </p:sp>
       <p:sp>
         <p:nvSpPr>
-          <p:cNvPr id="1142622748" name="Espace réservé pour le numéro de diapositive 3"/>
+          <p:cNvPr id="87799150" name="Espace réservé pour le numéro de diapositive 3"/>
           <p:cNvSpPr>
             <a:spLocks noGrp="1"/>
           </p:cNvSpPr>
@@ -1290,7 +1290,7 @@
       </p:grpSpPr>
       <p:sp>
         <p:nvSpPr>
-          <p:cNvPr id="611991045" name="Espace réservé pour l'image de la diapositive 1"/>
+          <p:cNvPr id="40938375" name="Espace réservé pour l'image de la diapositive 1"/>
           <p:cNvSpPr>
             <a:spLocks noChangeAspect="1" noGrp="1" noRot="1"/>
           </p:cNvSpPr>
@@ -1307,7 +1307,7 @@
       </p:sp>
       <p:sp>
         <p:nvSpPr>
-          <p:cNvPr id="1022554365" name="Remarques Espace réservé 2"/>
+          <p:cNvPr id="155362428" name="Remarques Espace réservé 2"/>
           <p:cNvSpPr>
             <a:spLocks noGrp="1"/>
           </p:cNvSpPr>
@@ -1332,7 +1332,7 @@
       </p:sp>
       <p:sp>
         <p:nvSpPr>
-          <p:cNvPr id="554975952" name="Espace réservé pour le numéro de diapositive 3"/>
+          <p:cNvPr id="83276531" name="Espace réservé pour le numéro de diapositive 3"/>
           <p:cNvSpPr>
             <a:spLocks noGrp="1"/>
           </p:cNvSpPr>
@@ -1380,7 +1380,7 @@
       </p:grpSpPr>
       <p:sp>
         <p:nvSpPr>
-          <p:cNvPr id="147524637" name="Titre 1"/>
+          <p:cNvPr id="1476134269" name="Titre 1"/>
           <p:cNvSpPr>
             <a:spLocks noGrp="1"/>
           </p:cNvSpPr>
@@ -1415,7 +1415,7 @@
       </p:sp>
       <p:sp>
         <p:nvSpPr>
-          <p:cNvPr id="525710509" name="Sous-titre 2"/>
+          <p:cNvPr id="2138381369" name="Sous-titre 2"/>
           <p:cNvSpPr>
             <a:spLocks noGrp="1"/>
           </p:cNvSpPr>
@@ -1483,7 +1483,7 @@
       </p:sp>
       <p:sp>
         <p:nvSpPr>
-          <p:cNvPr id="1604332236" name="Espace réservé de la date 3"/>
+          <p:cNvPr id="463513170" name="Espace réservé de la date 3"/>
           <p:cNvSpPr>
             <a:spLocks noGrp="1"/>
           </p:cNvSpPr>
@@ -1509,7 +1509,7 @@
       </p:sp>
       <p:sp>
         <p:nvSpPr>
-          <p:cNvPr id="1839028400" name="Espace réservé du pied de page 4"/>
+          <p:cNvPr id="1587153187" name="Espace réservé du pied de page 4"/>
           <p:cNvSpPr>
             <a:spLocks noGrp="1"/>
           </p:cNvSpPr>
@@ -1531,7 +1531,7 @@
       </p:sp>
       <p:sp>
         <p:nvSpPr>
-          <p:cNvPr id="1287400857" name="Espace réservé du numéro de diapositive 5"/>
+          <p:cNvPr id="1655090010" name="Espace réservé du numéro de diapositive 5"/>
           <p:cNvSpPr>
             <a:spLocks noGrp="1"/>
           </p:cNvSpPr>
@@ -1582,7 +1582,7 @@
       </p:grpSpPr>
       <p:sp>
         <p:nvSpPr>
-          <p:cNvPr id="1223940516" name="Titre 1"/>
+          <p:cNvPr id="1601817239" name="Titre 1"/>
           <p:cNvSpPr>
             <a:spLocks noGrp="1"/>
           </p:cNvSpPr>
@@ -1608,7 +1608,7 @@
       </p:sp>
       <p:sp>
         <p:nvSpPr>
-          <p:cNvPr id="1547152967" name="Espace réservé du texte vertical 2"/>
+          <p:cNvPr id="1213656412" name="Espace réservé du texte vertical 2"/>
           <p:cNvSpPr>
             <a:spLocks noGrp="1"/>
           </p:cNvSpPr>
@@ -1674,7 +1674,7 @@
       </p:sp>
       <p:sp>
         <p:nvSpPr>
-          <p:cNvPr id="2047982474" name="Espace réservé de la date 3"/>
+          <p:cNvPr id="1728445592" name="Espace réservé de la date 3"/>
           <p:cNvSpPr>
             <a:spLocks noGrp="1"/>
           </p:cNvSpPr>
@@ -1700,7 +1700,7 @@
       </p:sp>
       <p:sp>
         <p:nvSpPr>
-          <p:cNvPr id="1946965811" name="Espace réservé du pied de page 4"/>
+          <p:cNvPr id="1850396890" name="Espace réservé du pied de page 4"/>
           <p:cNvSpPr>
             <a:spLocks noGrp="1"/>
           </p:cNvSpPr>
@@ -1722,7 +1722,7 @@
       </p:sp>
       <p:sp>
         <p:nvSpPr>
-          <p:cNvPr id="1712611479" name="Espace réservé du numéro de diapositive 5"/>
+          <p:cNvPr id="843225242" name="Espace réservé du numéro de diapositive 5"/>
           <p:cNvSpPr>
             <a:spLocks noGrp="1"/>
           </p:cNvSpPr>
@@ -1773,7 +1773,7 @@
       </p:grpSpPr>
       <p:sp>
         <p:nvSpPr>
-          <p:cNvPr id="1166980043" name="Titre vertical 1"/>
+          <p:cNvPr id="1017093314" name="Titre vertical 1"/>
           <p:cNvSpPr>
             <a:spLocks noGrp="1"/>
           </p:cNvSpPr>
@@ -1804,7 +1804,7 @@
       </p:sp>
       <p:sp>
         <p:nvSpPr>
-          <p:cNvPr id="1897633704" name="Espace réservé du texte vertical 2"/>
+          <p:cNvPr id="1781616370" name="Espace réservé du texte vertical 2"/>
           <p:cNvSpPr>
             <a:spLocks noGrp="1"/>
           </p:cNvSpPr>
@@ -1875,7 +1875,7 @@
       </p:sp>
       <p:sp>
         <p:nvSpPr>
-          <p:cNvPr id="891518106" name="Espace réservé de la date 3"/>
+          <p:cNvPr id="872583664" name="Espace réservé de la date 3"/>
           <p:cNvSpPr>
             <a:spLocks noGrp="1"/>
           </p:cNvSpPr>
@@ -1901,7 +1901,7 @@
       </p:sp>
       <p:sp>
         <p:nvSpPr>
-          <p:cNvPr id="278166435" name="Espace réservé du pied de page 4"/>
+          <p:cNvPr id="1707531753" name="Espace réservé du pied de page 4"/>
           <p:cNvSpPr>
             <a:spLocks noGrp="1"/>
           </p:cNvSpPr>
@@ -1923,7 +1923,7 @@
       </p:sp>
       <p:sp>
         <p:nvSpPr>
-          <p:cNvPr id="421040137" name="Espace réservé du numéro de diapositive 5"/>
+          <p:cNvPr id="1544822960" name="Espace réservé du numéro de diapositive 5"/>
           <p:cNvSpPr>
             <a:spLocks noGrp="1"/>
           </p:cNvSpPr>
@@ -1974,7 +1974,7 @@
       </p:grpSpPr>
       <p:sp>
         <p:nvSpPr>
-          <p:cNvPr id="630237307" name="Titre 1"/>
+          <p:cNvPr id="1407998768" name="Titre 1"/>
           <p:cNvSpPr>
             <a:spLocks noGrp="1"/>
           </p:cNvSpPr>
@@ -2000,7 +2000,7 @@
       </p:sp>
       <p:sp>
         <p:nvSpPr>
-          <p:cNvPr id="2075457787" name="Espace réservé du contenu 2"/>
+          <p:cNvPr id="317436939" name="Espace réservé du contenu 2"/>
           <p:cNvSpPr>
             <a:spLocks noGrp="1"/>
           </p:cNvSpPr>
@@ -2066,7 +2066,7 @@
       </p:sp>
       <p:sp>
         <p:nvSpPr>
-          <p:cNvPr id="1358114802" name="Espace réservé de la date 3"/>
+          <p:cNvPr id="833451799" name="Espace réservé de la date 3"/>
           <p:cNvSpPr>
             <a:spLocks noGrp="1"/>
           </p:cNvSpPr>
@@ -2092,7 +2092,7 @@
       </p:sp>
       <p:sp>
         <p:nvSpPr>
-          <p:cNvPr id="1148719870" name="Espace réservé du pied de page 4"/>
+          <p:cNvPr id="329312209" name="Espace réservé du pied de page 4"/>
           <p:cNvSpPr>
             <a:spLocks noGrp="1"/>
           </p:cNvSpPr>
@@ -2114,7 +2114,7 @@
       </p:sp>
       <p:sp>
         <p:nvSpPr>
-          <p:cNvPr id="96085040" name="Espace réservé du numéro de diapositive 5"/>
+          <p:cNvPr id="892386757" name="Espace réservé du numéro de diapositive 5"/>
           <p:cNvSpPr>
             <a:spLocks noGrp="1"/>
           </p:cNvSpPr>
@@ -2165,7 +2165,7 @@
       </p:grpSpPr>
       <p:sp>
         <p:nvSpPr>
-          <p:cNvPr id="1536822283" name="Titre 1"/>
+          <p:cNvPr id="1209649433" name="Titre 1"/>
           <p:cNvSpPr>
             <a:spLocks noGrp="1"/>
           </p:cNvSpPr>
@@ -2200,7 +2200,7 @@
       </p:sp>
       <p:sp>
         <p:nvSpPr>
-          <p:cNvPr id="911343423" name="Espace réservé du texte 2"/>
+          <p:cNvPr id="1852274173" name="Espace réservé du texte 2"/>
           <p:cNvSpPr>
             <a:spLocks noGrp="1"/>
           </p:cNvSpPr>
@@ -2322,7 +2322,7 @@
       </p:sp>
       <p:sp>
         <p:nvSpPr>
-          <p:cNvPr id="1629541239" name="Espace réservé de la date 3"/>
+          <p:cNvPr id="1961831172" name="Espace réservé de la date 3"/>
           <p:cNvSpPr>
             <a:spLocks noGrp="1"/>
           </p:cNvSpPr>
@@ -2348,7 +2348,7 @@
       </p:sp>
       <p:sp>
         <p:nvSpPr>
-          <p:cNvPr id="970168298" name="Espace réservé du pied de page 4"/>
+          <p:cNvPr id="1862856220" name="Espace réservé du pied de page 4"/>
           <p:cNvSpPr>
             <a:spLocks noGrp="1"/>
           </p:cNvSpPr>
@@ -2370,7 +2370,7 @@
       </p:sp>
       <p:sp>
         <p:nvSpPr>
-          <p:cNvPr id="1791569053" name="Espace réservé du numéro de diapositive 5"/>
+          <p:cNvPr id="521380032" name="Espace réservé du numéro de diapositive 5"/>
           <p:cNvSpPr>
             <a:spLocks noGrp="1"/>
           </p:cNvSpPr>
@@ -2421,7 +2421,7 @@
       </p:grpSpPr>
       <p:sp>
         <p:nvSpPr>
-          <p:cNvPr id="2100064306" name="Titre 1"/>
+          <p:cNvPr id="1694629441" name="Titre 1"/>
           <p:cNvSpPr>
             <a:spLocks noGrp="1"/>
           </p:cNvSpPr>
@@ -2447,7 +2447,7 @@
       </p:sp>
       <p:sp>
         <p:nvSpPr>
-          <p:cNvPr id="290177422" name="Espace réservé du contenu 2"/>
+          <p:cNvPr id="1934137930" name="Espace réservé du contenu 2"/>
           <p:cNvSpPr>
             <a:spLocks noGrp="1"/>
           </p:cNvSpPr>
@@ -2518,7 +2518,7 @@
       </p:sp>
       <p:sp>
         <p:nvSpPr>
-          <p:cNvPr id="720522300" name="Espace réservé du contenu 3"/>
+          <p:cNvPr id="638653168" name="Espace réservé du contenu 3"/>
           <p:cNvSpPr>
             <a:spLocks noGrp="1"/>
           </p:cNvSpPr>
@@ -2589,7 +2589,7 @@
       </p:sp>
       <p:sp>
         <p:nvSpPr>
-          <p:cNvPr id="752263381" name="Espace réservé de la date 4"/>
+          <p:cNvPr id="1156077929" name="Espace réservé de la date 4"/>
           <p:cNvSpPr>
             <a:spLocks noGrp="1"/>
           </p:cNvSpPr>
@@ -2615,7 +2615,7 @@
       </p:sp>
       <p:sp>
         <p:nvSpPr>
-          <p:cNvPr id="736753027" name="Espace réservé du pied de page 5"/>
+          <p:cNvPr id="1609589678" name="Espace réservé du pied de page 5"/>
           <p:cNvSpPr>
             <a:spLocks noGrp="1"/>
           </p:cNvSpPr>
@@ -2637,7 +2637,7 @@
       </p:sp>
       <p:sp>
         <p:nvSpPr>
-          <p:cNvPr id="150446341" name="Espace réservé du numéro de diapositive 6"/>
+          <p:cNvPr id="565144414" name="Espace réservé du numéro de diapositive 6"/>
           <p:cNvSpPr>
             <a:spLocks noGrp="1"/>
           </p:cNvSpPr>
@@ -2688,7 +2688,7 @@
       </p:grpSpPr>
       <p:sp>
         <p:nvSpPr>
-          <p:cNvPr id="976868965" name="Titre 1"/>
+          <p:cNvPr id="1041098969" name="Titre 1"/>
           <p:cNvSpPr>
             <a:spLocks noGrp="1"/>
           </p:cNvSpPr>
@@ -2719,7 +2719,7 @@
       </p:sp>
       <p:sp>
         <p:nvSpPr>
-          <p:cNvPr id="592740686" name="Espace réservé du texte 2"/>
+          <p:cNvPr id="2053543993" name="Espace réservé du texte 2"/>
           <p:cNvSpPr>
             <a:spLocks noGrp="1"/>
           </p:cNvSpPr>
@@ -2787,7 +2787,7 @@
       </p:sp>
       <p:sp>
         <p:nvSpPr>
-          <p:cNvPr id="899671568" name="Espace réservé du contenu 3"/>
+          <p:cNvPr id="1000450193" name="Espace réservé du contenu 3"/>
           <p:cNvSpPr>
             <a:spLocks noGrp="1"/>
           </p:cNvSpPr>
@@ -2858,7 +2858,7 @@
       </p:sp>
       <p:sp>
         <p:nvSpPr>
-          <p:cNvPr id="1552014186" name="Espace réservé du texte 4"/>
+          <p:cNvPr id="1051653218" name="Espace réservé du texte 4"/>
           <p:cNvSpPr>
             <a:spLocks noGrp="1"/>
           </p:cNvSpPr>
@@ -2926,7 +2926,7 @@
       </p:sp>
       <p:sp>
         <p:nvSpPr>
-          <p:cNvPr id="517006362" name="Espace réservé du contenu 5"/>
+          <p:cNvPr id="1875133157" name="Espace réservé du contenu 5"/>
           <p:cNvSpPr>
             <a:spLocks noGrp="1"/>
           </p:cNvSpPr>
@@ -2997,7 +2997,7 @@
       </p:sp>
       <p:sp>
         <p:nvSpPr>
-          <p:cNvPr id="882986845" name="Espace réservé de la date 6"/>
+          <p:cNvPr id="1259263303" name="Espace réservé de la date 6"/>
           <p:cNvSpPr>
             <a:spLocks noGrp="1"/>
           </p:cNvSpPr>
@@ -3023,7 +3023,7 @@
       </p:sp>
       <p:sp>
         <p:nvSpPr>
-          <p:cNvPr id="2077859239" name="Espace réservé du pied de page 7"/>
+          <p:cNvPr id="1732792823" name="Espace réservé du pied de page 7"/>
           <p:cNvSpPr>
             <a:spLocks noGrp="1"/>
           </p:cNvSpPr>
@@ -3045,7 +3045,7 @@
       </p:sp>
       <p:sp>
         <p:nvSpPr>
-          <p:cNvPr id="1819306185" name="Espace réservé du numéro de diapositive 8"/>
+          <p:cNvPr id="1400766659" name="Espace réservé du numéro de diapositive 8"/>
           <p:cNvSpPr>
             <a:spLocks noGrp="1"/>
           </p:cNvSpPr>
@@ -3096,7 +3096,7 @@
       </p:grpSpPr>
       <p:sp>
         <p:nvSpPr>
-          <p:cNvPr id="2111518636" name="Titre 1"/>
+          <p:cNvPr id="1108868323" name="Titre 1"/>
           <p:cNvSpPr>
             <a:spLocks noGrp="1"/>
           </p:cNvSpPr>
@@ -3122,7 +3122,7 @@
       </p:sp>
       <p:sp>
         <p:nvSpPr>
-          <p:cNvPr id="1910482073" name="Espace réservé de la date 2"/>
+          <p:cNvPr id="44617882" name="Espace réservé de la date 2"/>
           <p:cNvSpPr>
             <a:spLocks noGrp="1"/>
           </p:cNvSpPr>
@@ -3148,7 +3148,7 @@
       </p:sp>
       <p:sp>
         <p:nvSpPr>
-          <p:cNvPr id="1656702448" name="Espace réservé du pied de page 3"/>
+          <p:cNvPr id="1186706671" name="Espace réservé du pied de page 3"/>
           <p:cNvSpPr>
             <a:spLocks noGrp="1"/>
           </p:cNvSpPr>
@@ -3170,7 +3170,7 @@
       </p:sp>
       <p:sp>
         <p:nvSpPr>
-          <p:cNvPr id="401735794" name="Espace réservé du numéro de diapositive 4"/>
+          <p:cNvPr id="1486955675" name="Espace réservé du numéro de diapositive 4"/>
           <p:cNvSpPr>
             <a:spLocks noGrp="1"/>
           </p:cNvSpPr>
@@ -3221,7 +3221,7 @@
       </p:grpSpPr>
       <p:sp>
         <p:nvSpPr>
-          <p:cNvPr id="621830575" name="Espace réservé de la date 1"/>
+          <p:cNvPr id="1186424784" name="Espace réservé de la date 1"/>
           <p:cNvSpPr>
             <a:spLocks noGrp="1"/>
           </p:cNvSpPr>
@@ -3247,7 +3247,7 @@
       </p:sp>
       <p:sp>
         <p:nvSpPr>
-          <p:cNvPr id="970847713" name="Espace réservé du pied de page 2"/>
+          <p:cNvPr id="1686174198" name="Espace réservé du pied de page 2"/>
           <p:cNvSpPr>
             <a:spLocks noGrp="1"/>
           </p:cNvSpPr>
@@ -3269,7 +3269,7 @@
       </p:sp>
       <p:sp>
         <p:nvSpPr>
-          <p:cNvPr id="1701131054" name="Espace réservé du numéro de diapositive 3"/>
+          <p:cNvPr id="1181216588" name="Espace réservé du numéro de diapositive 3"/>
           <p:cNvSpPr>
             <a:spLocks noGrp="1"/>
           </p:cNvSpPr>
@@ -3320,7 +3320,7 @@
       </p:grpSpPr>
       <p:sp>
         <p:nvSpPr>
-          <p:cNvPr id="78797217" name="Titre 1"/>
+          <p:cNvPr id="1460872619" name="Titre 1"/>
           <p:cNvSpPr>
             <a:spLocks noGrp="1"/>
           </p:cNvSpPr>
@@ -3355,7 +3355,7 @@
       </p:sp>
       <p:sp>
         <p:nvSpPr>
-          <p:cNvPr id="586395830" name="Espace réservé du contenu 2"/>
+          <p:cNvPr id="1365158312" name="Espace réservé du contenu 2"/>
           <p:cNvSpPr>
             <a:spLocks noGrp="1"/>
           </p:cNvSpPr>
@@ -3454,7 +3454,7 @@
       </p:sp>
       <p:sp>
         <p:nvSpPr>
-          <p:cNvPr id="816425102" name="Espace réservé du texte 3"/>
+          <p:cNvPr id="814314115" name="Espace réservé du texte 3"/>
           <p:cNvSpPr>
             <a:spLocks noGrp="1"/>
           </p:cNvSpPr>
@@ -3522,7 +3522,7 @@
       </p:sp>
       <p:sp>
         <p:nvSpPr>
-          <p:cNvPr id="911247365" name="Espace réservé de la date 4"/>
+          <p:cNvPr id="622823678" name="Espace réservé de la date 4"/>
           <p:cNvSpPr>
             <a:spLocks noGrp="1"/>
           </p:cNvSpPr>
@@ -3548,7 +3548,7 @@
       </p:sp>
       <p:sp>
         <p:nvSpPr>
-          <p:cNvPr id="95859627" name="Espace réservé du pied de page 5"/>
+          <p:cNvPr id="701923392" name="Espace réservé du pied de page 5"/>
           <p:cNvSpPr>
             <a:spLocks noGrp="1"/>
           </p:cNvSpPr>
@@ -3570,7 +3570,7 @@
       </p:sp>
       <p:sp>
         <p:nvSpPr>
-          <p:cNvPr id="1161280179" name="Espace réservé du numéro de diapositive 6"/>
+          <p:cNvPr id="455207446" name="Espace réservé du numéro de diapositive 6"/>
           <p:cNvSpPr>
             <a:spLocks noGrp="1"/>
           </p:cNvSpPr>
@@ -3621,7 +3621,7 @@
       </p:grpSpPr>
       <p:sp>
         <p:nvSpPr>
-          <p:cNvPr id="1107928923" name="Titre 1"/>
+          <p:cNvPr id="2118073373" name="Titre 1"/>
           <p:cNvSpPr>
             <a:spLocks noGrp="1"/>
           </p:cNvSpPr>
@@ -3656,7 +3656,7 @@
       </p:sp>
       <p:sp>
         <p:nvSpPr>
-          <p:cNvPr id="1788821528" name="Espace réservé pour une image 2"/>
+          <p:cNvPr id="828482897" name="Espace réservé pour une image 2"/>
           <p:cNvSpPr>
             <a:spLocks noChangeAspect="1" noGrp="1"/>
           </p:cNvSpPr>
@@ -3724,7 +3724,7 @@
       </p:sp>
       <p:sp>
         <p:nvSpPr>
-          <p:cNvPr id="1439758364" name="Espace réservé du texte 3"/>
+          <p:cNvPr id="1002115808" name="Espace réservé du texte 3"/>
           <p:cNvSpPr>
             <a:spLocks noGrp="1"/>
           </p:cNvSpPr>
@@ -3792,7 +3792,7 @@
       </p:sp>
       <p:sp>
         <p:nvSpPr>
-          <p:cNvPr id="1324687100" name="Espace réservé de la date 4"/>
+          <p:cNvPr id="1239778928" name="Espace réservé de la date 4"/>
           <p:cNvSpPr>
             <a:spLocks noGrp="1"/>
           </p:cNvSpPr>
@@ -3818,7 +3818,7 @@
       </p:sp>
       <p:sp>
         <p:nvSpPr>
-          <p:cNvPr id="1604320952" name="Espace réservé du pied de page 5"/>
+          <p:cNvPr id="672822562" name="Espace réservé du pied de page 5"/>
           <p:cNvSpPr>
             <a:spLocks noGrp="1"/>
           </p:cNvSpPr>
@@ -3840,7 +3840,7 @@
       </p:sp>
       <p:sp>
         <p:nvSpPr>
-          <p:cNvPr id="526429321" name="Espace réservé du numéro de diapositive 6"/>
+          <p:cNvPr id="428485544" name="Espace réservé du numéro de diapositive 6"/>
           <p:cNvSpPr>
             <a:spLocks noGrp="1"/>
           </p:cNvSpPr>
@@ -3896,7 +3896,7 @@
       </p:grpSpPr>
       <p:sp>
         <p:nvSpPr>
-          <p:cNvPr id="864174519" name="Espace réservé du titre 1"/>
+          <p:cNvPr id="970711257" name="Espace réservé du titre 1"/>
           <p:cNvSpPr>
             <a:spLocks noGrp="1"/>
           </p:cNvSpPr>
@@ -3932,7 +3932,7 @@
       </p:sp>
       <p:sp>
         <p:nvSpPr>
-          <p:cNvPr id="920558138" name="Espace réservé du texte 2"/>
+          <p:cNvPr id="468818567" name="Espace réservé du texte 2"/>
           <p:cNvSpPr>
             <a:spLocks noGrp="1"/>
           </p:cNvSpPr>
@@ -4008,7 +4008,7 @@
       </p:sp>
       <p:sp>
         <p:nvSpPr>
-          <p:cNvPr id="1004597328" name="Espace réservé de la date 3"/>
+          <p:cNvPr id="956840587" name="Espace réservé de la date 3"/>
           <p:cNvSpPr>
             <a:spLocks noGrp="1"/>
           </p:cNvSpPr>
@@ -4052,7 +4052,7 @@
       </p:sp>
       <p:sp>
         <p:nvSpPr>
-          <p:cNvPr id="811474670" name="Espace réservé du pied de page 4"/>
+          <p:cNvPr id="203921342" name="Espace réservé du pied de page 4"/>
           <p:cNvSpPr>
             <a:spLocks noGrp="1"/>
           </p:cNvSpPr>
@@ -4092,7 +4092,7 @@
       </p:sp>
       <p:sp>
         <p:nvSpPr>
-          <p:cNvPr id="798223598" name="Espace réservé du numéro de diapositive 5"/>
+          <p:cNvPr id="1265619126" name="Espace réservé du numéro de diapositive 5"/>
           <p:cNvSpPr>
             <a:spLocks noGrp="1"/>
           </p:cNvSpPr>
@@ -4459,7 +4459,7 @@
       </p:grpSpPr>
       <p:sp>
         <p:nvSpPr>
-          <p:cNvPr id="1466151509" name="Espace réservé du contenu 2"/>
+          <p:cNvPr id="32115584" name="Espace réservé du contenu 2"/>
           <p:cNvSpPr>
             <a:spLocks noGrp="1"/>
           </p:cNvSpPr>
@@ -4987,7 +4987,7 @@
       </p:sp>
       <p:sp>
         <p:nvSpPr>
-          <p:cNvPr id="153182857" name=""/>
+          <p:cNvPr id="1550629007" name=""/>
           <p:cNvSpPr txBox="1"/>
           <p:nvPr/>
         </p:nvSpPr>
@@ -5042,7 +5042,7 @@
       </p:sp>
       <p:sp>
         <p:nvSpPr>
-          <p:cNvPr id="1990691908" name=""/>
+          <p:cNvPr id="564789517" name=""/>
           <p:cNvSpPr txBox="1"/>
           <p:nvPr/>
         </p:nvSpPr>
@@ -5237,7 +5237,7 @@
       </p:sp>
       <p:sp>
         <p:nvSpPr>
-          <p:cNvPr id="2023940541" name=""/>
+          <p:cNvPr id="2031856514" name=""/>
           <p:cNvSpPr txBox="1"/>
           <p:nvPr/>
         </p:nvSpPr>
@@ -5655,7 +5655,7 @@
       </p:sp>
       <p:sp>
         <p:nvSpPr>
-          <p:cNvPr id="1099912105" name=""/>
+          <p:cNvPr id="696504787" name=""/>
           <p:cNvSpPr txBox="1"/>
           <p:nvPr/>
         </p:nvSpPr>
@@ -6014,7 +6014,7 @@
       </p:sp>
       <p:sp>
         <p:nvSpPr>
-          <p:cNvPr id="1434012896" name=""/>
+          <p:cNvPr id="1377719216" name=""/>
           <p:cNvSpPr txBox="1"/>
           <p:nvPr/>
         </p:nvSpPr>
@@ -6279,7 +6279,7 @@
       </p:sp>
       <p:sp>
         <p:nvSpPr>
-          <p:cNvPr id="785813667" name=""/>
+          <p:cNvPr id="357074352" name=""/>
           <p:cNvSpPr txBox="1"/>
           <p:nvPr/>
         </p:nvSpPr>
@@ -6451,7 +6451,7 @@
       </p:sp>
       <p:pic>
         <p:nvPicPr>
-          <p:cNvPr id="1642196256" name=""/>
+          <p:cNvPr id="327742156" name=""/>
           <p:cNvPicPr>
             <a:picLocks noChangeAspect="1"/>
           </p:cNvPicPr>
@@ -6473,7 +6473,7 @@
       </p:pic>
       <p:pic>
         <p:nvPicPr>
-          <p:cNvPr id="1126793822" name=""/>
+          <p:cNvPr id="1218356069" name=""/>
           <p:cNvPicPr>
             <a:picLocks noChangeAspect="1"/>
           </p:cNvPicPr>
@@ -6495,7 +6495,7 @@
       </p:pic>
       <p:pic>
         <p:nvPicPr>
-          <p:cNvPr id="597556606" name=""/>
+          <p:cNvPr id="2080660621" name=""/>
           <p:cNvPicPr>
             <a:picLocks noChangeAspect="1"/>
           </p:cNvPicPr>
@@ -6550,7 +6550,7 @@
       </p:grpSpPr>
       <p:sp>
         <p:nvSpPr>
-          <p:cNvPr id="211591124" name="Title 1"/>
+          <p:cNvPr id="1453704914" name="Title 1"/>
           <p:cNvSpPr>
             <a:spLocks noGrp="1"/>
           </p:cNvSpPr>
@@ -6593,7 +6593,7 @@
       </p:sp>
       <p:sp>
         <p:nvSpPr>
-          <p:cNvPr id="1597135256" name="Subtitle 2"/>
+          <p:cNvPr id="86950911" name="Subtitle 2"/>
           <p:cNvSpPr>
             <a:spLocks noGrp="1"/>
           </p:cNvSpPr>
@@ -6640,7 +6640,7 @@
       </p:sp>
       <p:sp>
         <p:nvSpPr>
-          <p:cNvPr id="1357324433" name="Zone de texte 1838115843"/>
+          <p:cNvPr id="2049881541" name="Zone de texte 1838115843"/>
           <p:cNvSpPr txBox="1"/>
           <p:nvPr/>
         </p:nvSpPr>
@@ -6744,7 +6744,7 @@
       </p:sp>
       <p:sp>
         <p:nvSpPr>
-          <p:cNvPr id="1683947413" name=""/>
+          <p:cNvPr id="1623366811" name=""/>
           <p:cNvSpPr txBox="1"/>
           <p:nvPr/>
         </p:nvSpPr>
@@ -6809,7 +6809,7 @@
       </p:grpSpPr>
       <p:sp>
         <p:nvSpPr>
-          <p:cNvPr id="1869335715" name=""/>
+          <p:cNvPr id="2109938645" name=""/>
           <p:cNvSpPr txBox="1"/>
           <p:nvPr/>
         </p:nvSpPr>
@@ -7277,7 +7277,7 @@
       </p:sp>
       <p:sp>
         <p:nvSpPr>
-          <p:cNvPr id="1418821398" name=""/>
+          <p:cNvPr id="1593366714" name=""/>
           <p:cNvSpPr txBox="1"/>
           <p:nvPr/>
         </p:nvSpPr>
@@ -7507,7 +7507,7 @@
       </p:sp>
       <p:sp>
         <p:nvSpPr>
-          <p:cNvPr id="1626584058" name=""/>
+          <p:cNvPr id="1768044077" name=""/>
           <p:cNvSpPr txBox="1"/>
           <p:nvPr/>
         </p:nvSpPr>
@@ -7637,7 +7637,7 @@
       </p:sp>
       <p:sp>
         <p:nvSpPr>
-          <p:cNvPr id="547889611" name=""/>
+          <p:cNvPr id="130688463" name=""/>
           <p:cNvSpPr txBox="1"/>
           <p:nvPr/>
         </p:nvSpPr>
@@ -7821,7 +7821,7 @@
       </p:sp>
       <p:sp>
         <p:nvSpPr>
-          <p:cNvPr id="20084868" name=""/>
+          <p:cNvPr id="1363711875" name=""/>
           <p:cNvSpPr txBox="1"/>
           <p:nvPr/>
         </p:nvSpPr>
@@ -7957,7 +7957,7 @@
       </p:sp>
       <p:sp>
         <p:nvSpPr>
-          <p:cNvPr id="662756942" name=""/>
+          <p:cNvPr id="1867723863" name=""/>
           <p:cNvSpPr/>
           <p:nvPr/>
         </p:nvSpPr>
@@ -7992,7 +7992,7 @@
       </p:sp>
       <p:sp>
         <p:nvSpPr>
-          <p:cNvPr id="1122111287" name=""/>
+          <p:cNvPr id="963289165" name=""/>
           <p:cNvSpPr/>
           <p:nvPr/>
         </p:nvSpPr>
@@ -8030,7 +8030,7 @@
       </p:sp>
       <p:sp>
         <p:nvSpPr>
-          <p:cNvPr id="179890683" name=""/>
+          <p:cNvPr id="736413045" name=""/>
           <p:cNvSpPr txBox="1"/>
           <p:nvPr/>
         </p:nvSpPr>
@@ -8070,7 +8070,7 @@
       </p:sp>
       <p:sp>
         <p:nvSpPr>
-          <p:cNvPr id="934576321" name=""/>
+          <p:cNvPr id="1252702146" name=""/>
           <p:cNvSpPr txBox="1"/>
           <p:nvPr/>
         </p:nvSpPr>
@@ -8353,7 +8353,7 @@
       </p:sp>
       <p:sp>
         <p:nvSpPr>
-          <p:cNvPr id="1037286270" name=""/>
+          <p:cNvPr id="1569131114" name=""/>
           <p:cNvSpPr txBox="1"/>
           <p:nvPr/>
         </p:nvSpPr>
@@ -8487,7 +8487,7 @@
       </p:sp>
       <p:sp>
         <p:nvSpPr>
-          <p:cNvPr id="1515256642" name=""/>
+          <p:cNvPr id="2071663537" name=""/>
           <p:cNvSpPr txBox="1"/>
           <p:nvPr/>
         </p:nvSpPr>
@@ -8605,7 +8605,7 @@
       </p:sp>
       <p:cxnSp>
         <p:nvCxnSpPr>
-          <p:cNvPr id="1213393768" name=""/>
+          <p:cNvPr id="1421205318" name=""/>
           <p:cNvCxnSpPr/>
           <p:nvPr/>
         </p:nvCxnSpPr>
@@ -8645,7 +8645,7 @@
       </p:cxnSp>
       <p:cxnSp>
         <p:nvCxnSpPr>
-          <p:cNvPr id="556614872" name=""/>
+          <p:cNvPr id="483891634" name=""/>
           <p:cNvCxnSpPr/>
           <p:nvPr/>
         </p:nvCxnSpPr>
@@ -8685,7 +8685,7 @@
       </p:cxnSp>
       <p:cxnSp>
         <p:nvCxnSpPr>
-          <p:cNvPr id="1991309131" name=""/>
+          <p:cNvPr id="573878324" name=""/>
           <p:cNvCxnSpPr/>
           <p:nvPr/>
         </p:nvCxnSpPr>
@@ -8725,7 +8725,7 @@
       </p:cxnSp>
       <p:cxnSp>
         <p:nvCxnSpPr>
-          <p:cNvPr id="1865222919" name=""/>
+          <p:cNvPr id="10668303" name=""/>
           <p:cNvCxnSpPr/>
           <p:nvPr/>
         </p:nvCxnSpPr>
@@ -8765,7 +8765,7 @@
       </p:cxnSp>
       <p:sp>
         <p:nvSpPr>
-          <p:cNvPr id="837398903" name=""/>
+          <p:cNvPr id="539693192" name=""/>
           <p:cNvSpPr txBox="1"/>
           <p:nvPr/>
         </p:nvSpPr>
@@ -8879,7 +8879,7 @@
       </p:grpSpPr>
       <p:sp>
         <p:nvSpPr>
-          <p:cNvPr id="1153364149" name=""/>
+          <p:cNvPr id="578119301" name=""/>
           <p:cNvSpPr txBox="1"/>
           <p:nvPr/>
         </p:nvSpPr>
@@ -9119,7 +9119,7 @@
       </p:sp>
       <p:sp>
         <p:nvSpPr>
-          <p:cNvPr id="688924871" name=""/>
+          <p:cNvPr id="831338252" name=""/>
           <p:cNvSpPr txBox="1"/>
           <p:nvPr/>
         </p:nvSpPr>
@@ -9266,7 +9266,7 @@
       </p:sp>
       <p:sp>
         <p:nvSpPr>
-          <p:cNvPr id="1455522148" name=""/>
+          <p:cNvPr id="1036259772" name=""/>
           <p:cNvSpPr txBox="1"/>
           <p:nvPr/>
         </p:nvSpPr>
@@ -9444,7 +9444,7 @@
       </p:sp>
       <p:sp>
         <p:nvSpPr>
-          <p:cNvPr id="752068356" name=""/>
+          <p:cNvPr id="1663165378" name=""/>
           <p:cNvSpPr txBox="1"/>
           <p:nvPr/>
         </p:nvSpPr>
@@ -9580,7 +9580,7 @@
       </p:sp>
       <p:sp>
         <p:nvSpPr>
-          <p:cNvPr id="890914852" name=""/>
+          <p:cNvPr id="182833511" name=""/>
           <p:cNvSpPr/>
           <p:nvPr/>
         </p:nvSpPr>
@@ -9615,7 +9615,7 @@
       </p:sp>
       <p:sp>
         <p:nvSpPr>
-          <p:cNvPr id="1168592503" name=""/>
+          <p:cNvPr id="404258997" name=""/>
           <p:cNvSpPr/>
           <p:nvPr/>
         </p:nvSpPr>
@@ -9653,7 +9653,7 @@
       </p:sp>
       <p:sp>
         <p:nvSpPr>
-          <p:cNvPr id="109007959" name=""/>
+          <p:cNvPr id="1667168724" name=""/>
           <p:cNvSpPr txBox="1"/>
           <p:nvPr/>
         </p:nvSpPr>
@@ -9693,7 +9693,7 @@
       </p:sp>
       <p:sp>
         <p:nvSpPr>
-          <p:cNvPr id="2014630203" name=""/>
+          <p:cNvPr id="448215411" name=""/>
           <p:cNvSpPr txBox="1"/>
           <p:nvPr/>
         </p:nvSpPr>
@@ -10048,7 +10048,7 @@
       </p:sp>
       <p:sp>
         <p:nvSpPr>
-          <p:cNvPr id="2026500885" name=""/>
+          <p:cNvPr id="240247586" name=""/>
           <p:cNvSpPr txBox="1"/>
           <p:nvPr/>
         </p:nvSpPr>
@@ -10182,7 +10182,7 @@
       </p:sp>
       <p:sp>
         <p:nvSpPr>
-          <p:cNvPr id="234818510" name=""/>
+          <p:cNvPr id="29266097" name=""/>
           <p:cNvSpPr txBox="1"/>
           <p:nvPr/>
         </p:nvSpPr>
@@ -10387,7 +10387,7 @@
       </p:sp>
       <p:cxnSp>
         <p:nvCxnSpPr>
-          <p:cNvPr id="1397206457" name=""/>
+          <p:cNvPr id="914107395" name=""/>
           <p:cNvCxnSpPr/>
           <p:nvPr/>
         </p:nvCxnSpPr>
@@ -10427,7 +10427,7 @@
       </p:cxnSp>
       <p:cxnSp>
         <p:nvCxnSpPr>
-          <p:cNvPr id="1649482965" name=""/>
+          <p:cNvPr id="1442500530" name=""/>
           <p:cNvCxnSpPr/>
           <p:nvPr/>
         </p:nvCxnSpPr>
@@ -10467,7 +10467,7 @@
       </p:cxnSp>
       <p:cxnSp>
         <p:nvCxnSpPr>
-          <p:cNvPr id="227087847" name=""/>
+          <p:cNvPr id="822519432" name=""/>
           <p:cNvCxnSpPr/>
           <p:nvPr/>
         </p:nvCxnSpPr>
@@ -10507,7 +10507,7 @@
       </p:cxnSp>
       <p:cxnSp>
         <p:nvCxnSpPr>
-          <p:cNvPr id="1056832008" name=""/>
+          <p:cNvPr id="1036501495" name=""/>
           <p:cNvCxnSpPr/>
           <p:nvPr/>
         </p:nvCxnSpPr>
@@ -10547,7 +10547,7 @@
       </p:cxnSp>
       <p:sp>
         <p:nvSpPr>
-          <p:cNvPr id="1190821151" name=""/>
+          <p:cNvPr id="1353573721" name=""/>
           <p:cNvSpPr txBox="1"/>
           <p:nvPr/>
         </p:nvSpPr>
@@ -11400,8 +11400,8 @@
         </p:nvSpPr>
         <p:spPr bwMode="auto">
           <a:xfrm flipH="0" flipV="0">
-            <a:off x="3579152" y="247725"/>
-            <a:ext cx="2461032" cy="3293513"/>
+            <a:off x="3284892" y="349308"/>
+            <a:ext cx="2812907" cy="5413187"/>
           </a:xfrm>
           <a:prstGeom prst="rect">
             <a:avLst/>
@@ -11446,7 +11446,7 @@
             </a:pPr>
             <a:r>
               <a:rPr sz="1000"/>
-              <a:t>objectif :</a:t>
+              <a:t>Objectif :</a:t>
             </a:r>
             <a:endParaRPr sz="1000"/>
           </a:p>
@@ -11615,7 +11615,7 @@
             </a:pPr>
             <a:r>
               <a:rPr sz="1000"/>
-              <a:t> ! losrsq plusieurs fois ds la mêm case -&gt; l’image reste fixe </a:t>
+              <a:t> ! losrsq plusieurs fois ds la mêm case -&gt; l’image reste « fixe « </a:t>
             </a:r>
             <a:endParaRPr sz="1000"/>
           </a:p>
@@ -11638,18 +11638,42 @@
             <a:endParaRPr sz="1000"/>
           </a:p>
           <a:p>
-            <a:pPr>
-              <a:defRPr/>
-            </a:pPr>
-            <a:endParaRPr sz="1000"/>
-          </a:p>
-          <a:p>
-            <a:pPr>
+            <a:pPr marL="0" marR="0" indent="0" algn="l">
+              <a:lnSpc>
+                <a:spcPct val="100000"/>
+              </a:lnSpc>
+              <a:spcBef>
+                <a:spcPts val="0"/>
+              </a:spcBef>
+              <a:spcAft>
+                <a:spcPts val="0"/>
+              </a:spcAft>
+              <a:defRPr/>
+            </a:pPr>
+            <a:endParaRPr lang="fr-FR" sz="1000" b="0" i="0" u="none" strike="noStrike" cap="none" spc="0">
+              <a:solidFill>
+                <a:schemeClr val="tx1"/>
+              </a:solidFill>
+              <a:latin typeface="Arial"/>
+              <a:cs typeface="Arial"/>
+            </a:endParaRPr>
+          </a:p>
+          <a:p>
+            <a:pPr marL="0" marR="0" indent="0" algn="l">
+              <a:lnSpc>
+                <a:spcPct val="100000"/>
+              </a:lnSpc>
+              <a:spcBef>
+                <a:spcPts val="0"/>
+              </a:spcBef>
+              <a:spcAft>
+                <a:spcPts val="0"/>
+              </a:spcAft>
               <a:defRPr/>
             </a:pPr>
             <a:r>
               <a:rPr sz="1000"/>
-              <a:t>&gt; if click s/</a:t>
+              <a:t>&gt; if </a:t>
             </a:r>
             <a:r>
               <a:rPr lang="fr-FR" sz="1000" b="0" i="0" u="none" strike="noStrike" cap="none" spc="0">
@@ -11660,6 +11684,21 @@
                 <a:ea typeface="Arial"/>
                 <a:cs typeface="Arial"/>
               </a:rPr>
+              <a:t>click </a:t>
+            </a:r>
+            <a:r>
+              <a:rPr sz="1000"/>
+              <a:t>s/</a:t>
+            </a:r>
+            <a:r>
+              <a:rPr lang="fr-FR" sz="1000" b="0" i="0" u="none" strike="noStrike" cap="none" spc="0">
+                <a:solidFill>
+                  <a:schemeClr val="tx1"/>
+                </a:solidFill>
+                <a:latin typeface="Arial"/>
+                <a:ea typeface="Arial"/>
+                <a:cs typeface="Arial"/>
+              </a:rPr>
               <a:t>Coconut</a:t>
             </a:r>
             <a:r>
@@ -11676,6 +11715,273 @@
             <a:pPr>
               <a:defRPr/>
             </a:pPr>
+            <a:endParaRPr sz="1000"/>
+          </a:p>
+          <a:p>
+            <a:pPr>
+              <a:defRPr/>
+            </a:pPr>
+            <a:endParaRPr sz="1000"/>
+          </a:p>
+          <a:p>
+            <a:pPr>
+              <a:defRPr/>
+            </a:pPr>
+            <a:r>
+              <a:rPr sz="1000"/>
+              <a:t>_____</a:t>
+            </a:r>
+            <a:endParaRPr sz="1000"/>
+          </a:p>
+          <a:p>
+            <a:pPr marL="0" marR="0" indent="0" algn="l">
+              <a:lnSpc>
+                <a:spcPct val="100000"/>
+              </a:lnSpc>
+              <a:spcBef>
+                <a:spcPts val="0"/>
+              </a:spcBef>
+              <a:spcAft>
+                <a:spcPts val="0"/>
+              </a:spcAft>
+              <a:defRPr/>
+            </a:pPr>
+            <a:r>
+              <a:rPr lang="fr-FR" sz="1000" b="0" i="0" u="none" strike="noStrike" cap="none" spc="0">
+                <a:solidFill>
+                  <a:schemeClr val="tx1"/>
+                </a:solidFill>
+                <a:latin typeface="Arial"/>
+                <a:ea typeface="Arial"/>
+                <a:cs typeface="Arial"/>
+              </a:rPr>
+              <a:t>/</a:t>
+            </a:r>
+            <a:r>
+              <a:rPr lang="fr-FR" sz="1000" b="0" i="0" u="none" strike="noStrike" cap="none" spc="0">
+                <a:solidFill>
+                  <a:srgbClr val="FF0000"/>
+                </a:solidFill>
+                <a:latin typeface="Arial"/>
+                <a:ea typeface="Arial"/>
+                <a:cs typeface="Arial"/>
+              </a:rPr>
+              <a:t>probleme :</a:t>
+            </a:r>
+            <a:br>
+              <a:rPr lang="fr-FR" sz="1000" b="0" i="0" u="none" strike="noStrike" cap="none" spc="0">
+                <a:solidFill>
+                  <a:srgbClr val="FF0000"/>
+                </a:solidFill>
+                <a:latin typeface="Arial"/>
+                <a:ea typeface="Arial"/>
+                <a:cs typeface="Arial"/>
+              </a:rPr>
+            </a:br>
+            <a:endParaRPr sz="1000" b="0" i="0" u="none" strike="noStrike" cap="none" spc="0">
+              <a:solidFill>
+                <a:srgbClr val="FF0000"/>
+              </a:solidFill>
+              <a:latin typeface="Arial"/>
+              <a:cs typeface="Arial"/>
+            </a:endParaRPr>
+          </a:p>
+          <a:p>
+            <a:pPr marL="0" marR="0" indent="0" algn="l">
+              <a:lnSpc>
+                <a:spcPct val="100000"/>
+              </a:lnSpc>
+              <a:spcBef>
+                <a:spcPts val="0"/>
+              </a:spcBef>
+              <a:spcAft>
+                <a:spcPts val="0"/>
+              </a:spcAft>
+              <a:defRPr/>
+            </a:pPr>
+            <a:r>
+              <a:rPr lang="fr-FR" sz="1000" b="0" i="0" u="none" strike="noStrike" cap="none" spc="0">
+                <a:solidFill>
+                  <a:srgbClr val="FF0000"/>
+                </a:solidFill>
+                <a:latin typeface="Arial"/>
+                <a:ea typeface="Arial"/>
+                <a:cs typeface="Arial"/>
+              </a:rPr>
+              <a:t>// si click sur cocoN =&gt; + 1 à +5pt </a:t>
+            </a:r>
+            <a:endParaRPr sz="1000" b="0" i="0" u="none" strike="noStrike" cap="none" spc="0">
+              <a:solidFill>
+                <a:srgbClr val="FF0000"/>
+              </a:solidFill>
+              <a:latin typeface="Arial"/>
+              <a:cs typeface="Arial"/>
+            </a:endParaRPr>
+          </a:p>
+          <a:p>
+            <a:pPr marL="0" marR="0" indent="0" algn="l">
+              <a:lnSpc>
+                <a:spcPct val="100000"/>
+              </a:lnSpc>
+              <a:spcBef>
+                <a:spcPts val="0"/>
+              </a:spcBef>
+              <a:spcAft>
+                <a:spcPts val="0"/>
+              </a:spcAft>
+              <a:defRPr/>
+            </a:pPr>
+            <a:r>
+              <a:rPr lang="fr-FR" sz="1000" b="0" i="0" u="none" strike="noStrike" cap="none" spc="0">
+                <a:solidFill>
+                  <a:srgbClr val="FF0000"/>
+                </a:solidFill>
+                <a:latin typeface="Arial"/>
+                <a:ea typeface="Arial"/>
+                <a:cs typeface="Arial"/>
+              </a:rPr>
+              <a:t>// si click sur sabl =&gt; + pt</a:t>
+            </a:r>
+            <a:br>
+              <a:rPr lang="fr-FR" sz="1000" b="0" i="0" u="none" strike="noStrike" cap="none" spc="0">
+                <a:solidFill>
+                  <a:srgbClr val="FF0000"/>
+                </a:solidFill>
+                <a:latin typeface="Arial"/>
+                <a:ea typeface="Arial"/>
+                <a:cs typeface="Arial"/>
+              </a:rPr>
+            </a:br>
+            <a:endParaRPr sz="1000" b="0" i="0" u="none" strike="noStrike" cap="none" spc="0">
+              <a:solidFill>
+                <a:srgbClr val="FF0000"/>
+              </a:solidFill>
+              <a:latin typeface="Arial"/>
+              <a:cs typeface="Arial"/>
+            </a:endParaRPr>
+          </a:p>
+          <a:p>
+            <a:pPr marL="0" marR="0" indent="0" algn="l">
+              <a:lnSpc>
+                <a:spcPct val="100000"/>
+              </a:lnSpc>
+              <a:spcBef>
+                <a:spcPts val="0"/>
+              </a:spcBef>
+              <a:spcAft>
+                <a:spcPts val="0"/>
+              </a:spcAft>
+              <a:defRPr/>
+            </a:pPr>
+            <a:r>
+              <a:rPr lang="fr-FR" sz="1000" b="0" i="0" u="none" strike="noStrike" cap="none" spc="0">
+                <a:solidFill>
+                  <a:srgbClr val="FF0000"/>
+                </a:solidFill>
+                <a:latin typeface="Arial"/>
+                <a:ea typeface="Arial"/>
+                <a:cs typeface="Arial"/>
+              </a:rPr>
+              <a:t>//question :</a:t>
+            </a:r>
+            <a:endParaRPr sz="1000" b="0" i="0" u="none" strike="noStrike" cap="none" spc="0">
+              <a:solidFill>
+                <a:srgbClr val="FF0000"/>
+              </a:solidFill>
+              <a:latin typeface="Arial"/>
+              <a:cs typeface="Arial"/>
+            </a:endParaRPr>
+          </a:p>
+          <a:p>
+            <a:pPr marL="0" marR="0" indent="0" algn="l">
+              <a:lnSpc>
+                <a:spcPct val="100000"/>
+              </a:lnSpc>
+              <a:spcBef>
+                <a:spcPts val="0"/>
+              </a:spcBef>
+              <a:spcAft>
+                <a:spcPts val="0"/>
+              </a:spcAft>
+              <a:defRPr/>
+            </a:pPr>
+            <a:r>
+              <a:rPr lang="fr-FR" sz="1000" b="0" i="0" u="none" strike="noStrike" cap="none" spc="0">
+                <a:solidFill>
+                  <a:srgbClr val="FF0000"/>
+                </a:solidFill>
+                <a:latin typeface="Arial"/>
+                <a:ea typeface="Arial"/>
+                <a:cs typeface="Arial"/>
+              </a:rPr>
+              <a:t>// Score </a:t>
+            </a:r>
+            <a:r>
+              <a:rPr sz="900" b="0" i="0" u="none">
+                <a:solidFill>
+                  <a:srgbClr val="FF0000"/>
+                </a:solidFill>
+                <a:latin typeface="Consolas"/>
+                <a:ea typeface="Consolas"/>
+                <a:cs typeface="Consolas"/>
+              </a:rPr>
+              <a:t>=&gt; le nbr qui apparait ds ma console</a:t>
+            </a:r>
+            <a:endParaRPr sz="1000"/>
+          </a:p>
+          <a:p>
+            <a:pPr>
+              <a:defRPr/>
+            </a:pPr>
+            <a:r>
+              <a:rPr sz="1000"/>
+              <a:t>______________________________</a:t>
+            </a:r>
+            <a:endParaRPr sz="1000"/>
+          </a:p>
+          <a:p>
+            <a:pPr>
+              <a:defRPr/>
+            </a:pPr>
+            <a:r>
+              <a:rPr sz="1000">
+                <a:highlight>
+                  <a:srgbClr val="FFFF00"/>
+                </a:highlight>
+              </a:rPr>
+              <a:t>=&gt; ds quel ordre </a:t>
+            </a:r>
+            <a:r>
+              <a:rPr sz="1000">
+                <a:solidFill>
+                  <a:srgbClr val="FF0000"/>
+                </a:solidFill>
+                <a:highlight>
+                  <a:srgbClr val="FFFF00"/>
+                </a:highlight>
+              </a:rPr>
+              <a:t>?</a:t>
+            </a:r>
+            <a:endParaRPr sz="1000"/>
+          </a:p>
+          <a:p>
+            <a:pPr>
+              <a:defRPr/>
+            </a:pPr>
+            <a:r>
+              <a:rPr sz="1000"/>
+              <a:t>&gt; score</a:t>
+            </a:r>
+            <a:endParaRPr sz="1000"/>
+          </a:p>
+          <a:p>
+            <a:pPr>
+              <a:defRPr/>
+            </a:pPr>
+            <a:r>
+              <a:rPr sz="1000"/>
+              <a:t>&gt; timer</a:t>
+            </a:r>
             <a:endParaRPr sz="1000"/>
           </a:p>
           <a:p>
@@ -13335,7 +13641,7 @@
       </p:grpSpPr>
       <p:sp>
         <p:nvSpPr>
-          <p:cNvPr id="765212445" name="Title 1"/>
+          <p:cNvPr id="456690650" name="Title 1"/>
           <p:cNvSpPr>
             <a:spLocks noGrp="1"/>
           </p:cNvSpPr>
@@ -13378,7 +13684,7 @@
       </p:sp>
       <p:sp>
         <p:nvSpPr>
-          <p:cNvPr id="1206861855" name="Zone de texte 1838115843"/>
+          <p:cNvPr id="321707038" name="Zone de texte 1838115843"/>
           <p:cNvSpPr txBox="1"/>
           <p:nvPr/>
         </p:nvSpPr>
@@ -13524,7 +13830,7 @@
       </p:sp>
       <p:sp>
         <p:nvSpPr>
-          <p:cNvPr id="2031485648" name="Zone de texte 5"/>
+          <p:cNvPr id="901727469" name="Zone de texte 5"/>
           <p:cNvSpPr txBox="1"/>
           <p:nvPr/>
         </p:nvSpPr>
@@ -13558,7 +13864,7 @@
       </p:sp>
       <p:sp>
         <p:nvSpPr>
-          <p:cNvPr id="1227910664" name="Subtitle 2"/>
+          <p:cNvPr id="983125416" name="Subtitle 2"/>
           <p:cNvSpPr>
             <a:spLocks noGrp="1"/>
           </p:cNvSpPr>
@@ -13804,7 +14110,7 @@
       </p:sp>
       <p:sp>
         <p:nvSpPr>
-          <p:cNvPr id="1890611968" name="Zone de texte 5"/>
+          <p:cNvPr id="1773391514" name="Zone de texte 5"/>
           <p:cNvSpPr txBox="1"/>
           <p:nvPr/>
         </p:nvSpPr>
@@ -13975,7 +14281,7 @@
       </p:sp>
       <p:sp>
         <p:nvSpPr>
-          <p:cNvPr id="1387242348" name="Zone de texte 5"/>
+          <p:cNvPr id="1543252343" name="Zone de texte 5"/>
           <p:cNvSpPr txBox="1"/>
           <p:nvPr/>
         </p:nvSpPr>
@@ -14015,7 +14321,7 @@
       </p:sp>
       <p:sp>
         <p:nvSpPr>
-          <p:cNvPr id="1050322067" name="Zone de texte 5"/>
+          <p:cNvPr id="1033061755" name="Zone de texte 5"/>
           <p:cNvSpPr txBox="1"/>
           <p:nvPr/>
         </p:nvSpPr>
@@ -14055,7 +14361,7 @@
       </p:sp>
       <p:sp>
         <p:nvSpPr>
-          <p:cNvPr id="146634316" name=""/>
+          <p:cNvPr id="1163241984" name=""/>
           <p:cNvSpPr txBox="1"/>
           <p:nvPr/>
         </p:nvSpPr>
@@ -14083,7 +14389,7 @@
       </p:sp>
       <p:sp>
         <p:nvSpPr>
-          <p:cNvPr id="572358655" name="Subtitle 2"/>
+          <p:cNvPr id="1844232201" name="Subtitle 2"/>
           <p:cNvSpPr>
             <a:spLocks noGrp="1"/>
           </p:cNvSpPr>
@@ -14306,7 +14612,7 @@
       </p:sp>
       <p:sp>
         <p:nvSpPr>
-          <p:cNvPr id="1978659738" name="Zone de texte 5"/>
+          <p:cNvPr id="514250226" name="Zone de texte 5"/>
           <p:cNvSpPr txBox="1"/>
           <p:nvPr/>
         </p:nvSpPr>
@@ -14350,7 +14656,7 @@
       </p:sp>
       <p:sp>
         <p:nvSpPr>
-          <p:cNvPr id="303147734" name=""/>
+          <p:cNvPr id="993045999" name=""/>
           <p:cNvSpPr/>
           <p:nvPr/>
         </p:nvSpPr>
@@ -14385,7 +14691,7 @@
       </p:sp>
       <p:sp>
         <p:nvSpPr>
-          <p:cNvPr id="39527121" name=""/>
+          <p:cNvPr id="127814002" name=""/>
           <p:cNvSpPr/>
           <p:nvPr/>
         </p:nvSpPr>
@@ -14423,7 +14729,7 @@
       </p:sp>
       <p:sp>
         <p:nvSpPr>
-          <p:cNvPr id="1998323827" name=""/>
+          <p:cNvPr id="381701094" name=""/>
           <p:cNvSpPr txBox="1"/>
           <p:nvPr/>
         </p:nvSpPr>
@@ -14496,7 +14802,7 @@
       </p:grpSpPr>
       <p:sp>
         <p:nvSpPr>
-          <p:cNvPr id="1730656159" name="Title 1"/>
+          <p:cNvPr id="216536944" name="Title 1"/>
           <p:cNvSpPr>
             <a:spLocks noGrp="1"/>
           </p:cNvSpPr>
@@ -14542,7 +14848,7 @@
       </p:sp>
       <p:sp>
         <p:nvSpPr>
-          <p:cNvPr id="1217811849" name="Subtitle 2"/>
+          <p:cNvPr id="1965791364" name="Subtitle 2"/>
           <p:cNvSpPr>
             <a:spLocks noGrp="1"/>
           </p:cNvSpPr>
@@ -14647,7 +14953,7 @@
       </p:sp>
       <p:sp>
         <p:nvSpPr>
-          <p:cNvPr id="261276229" name="Subtitle 2"/>
+          <p:cNvPr id="1254796132" name="Subtitle 2"/>
           <p:cNvSpPr>
             <a:spLocks noGrp="1"/>
           </p:cNvSpPr>
@@ -14915,7 +15221,7 @@
       </p:sp>
       <p:sp>
         <p:nvSpPr>
-          <p:cNvPr id="1499192500" name="Subtitle 2"/>
+          <p:cNvPr id="66366205" name="Subtitle 2"/>
           <p:cNvSpPr>
             <a:spLocks noGrp="1"/>
           </p:cNvSpPr>
@@ -15183,7 +15489,7 @@
       </p:sp>
       <p:sp>
         <p:nvSpPr>
-          <p:cNvPr id="215230914" name="Zone de texte 1838115843"/>
+          <p:cNvPr id="778700750" name="Zone de texte 1838115843"/>
           <p:cNvSpPr txBox="1"/>
           <p:nvPr/>
         </p:nvSpPr>
@@ -15291,7 +15597,7 @@
       </p:sp>
       <p:sp>
         <p:nvSpPr>
-          <p:cNvPr id="495221079" name="Zone de texte 4"/>
+          <p:cNvPr id="666576134" name="Zone de texte 4"/>
           <p:cNvSpPr txBox="1"/>
           <p:nvPr/>
         </p:nvSpPr>
@@ -15325,7 +15631,7 @@
       </p:sp>
       <p:sp>
         <p:nvSpPr>
-          <p:cNvPr id="1996605248" name="Zone de texte 5"/>
+          <p:cNvPr id="1672892279" name="Zone de texte 5"/>
           <p:cNvSpPr txBox="1"/>
           <p:nvPr/>
         </p:nvSpPr>
@@ -15359,7 +15665,7 @@
       </p:sp>
       <p:sp>
         <p:nvSpPr>
-          <p:cNvPr id="1048038400" name="Zone de texte 5"/>
+          <p:cNvPr id="630966102" name="Zone de texte 5"/>
           <p:cNvSpPr txBox="1"/>
           <p:nvPr/>
         </p:nvSpPr>
@@ -15425,7 +15731,7 @@
       </p:sp>
       <p:sp>
         <p:nvSpPr>
-          <p:cNvPr id="1129757186" name="Zone de texte 5"/>
+          <p:cNvPr id="1471522607" name="Zone de texte 5"/>
           <p:cNvSpPr txBox="1"/>
           <p:nvPr/>
         </p:nvSpPr>
@@ -15459,7 +15765,7 @@
       </p:sp>
       <p:sp>
         <p:nvSpPr>
-          <p:cNvPr id="409705580" name="Subtitle 2"/>
+          <p:cNvPr id="1577815342" name="Subtitle 2"/>
           <p:cNvSpPr>
             <a:spLocks noGrp="1"/>
           </p:cNvSpPr>
@@ -15730,7 +16036,7 @@
       </p:sp>
       <p:sp>
         <p:nvSpPr>
-          <p:cNvPr id="1832871784" name="Subtitle 2"/>
+          <p:cNvPr id="997256790" name="Subtitle 2"/>
           <p:cNvSpPr>
             <a:spLocks noGrp="1"/>
           </p:cNvSpPr>
@@ -15998,7 +16304,7 @@
       </p:sp>
       <p:sp>
         <p:nvSpPr>
-          <p:cNvPr id="458489025" name=""/>
+          <p:cNvPr id="1720768921" name=""/>
           <p:cNvSpPr/>
           <p:nvPr/>
         </p:nvSpPr>
@@ -16033,7 +16339,7 @@
       </p:sp>
       <p:sp>
         <p:nvSpPr>
-          <p:cNvPr id="685262283" name=""/>
+          <p:cNvPr id="1721936037" name=""/>
           <p:cNvSpPr/>
           <p:nvPr/>
         </p:nvSpPr>
@@ -16071,7 +16377,7 @@
       </p:sp>
       <p:sp>
         <p:nvSpPr>
-          <p:cNvPr id="1433269581" name=""/>
+          <p:cNvPr id="1148870885" name=""/>
           <p:cNvSpPr txBox="1"/>
           <p:nvPr/>
         </p:nvSpPr>
@@ -16144,7 +16450,7 @@
       </p:grpSpPr>
       <p:sp>
         <p:nvSpPr>
-          <p:cNvPr id="372208611" name="Title 1"/>
+          <p:cNvPr id="1236683070" name="Title 1"/>
           <p:cNvSpPr>
             <a:spLocks noGrp="1"/>
           </p:cNvSpPr>
@@ -16190,7 +16496,7 @@
       </p:sp>
       <p:sp>
         <p:nvSpPr>
-          <p:cNvPr id="427644950" name="Subtitle 2"/>
+          <p:cNvPr id="909978883" name="Subtitle 2"/>
           <p:cNvSpPr>
             <a:spLocks noGrp="1"/>
           </p:cNvSpPr>
@@ -16295,7 +16601,7 @@
       </p:sp>
       <p:sp>
         <p:nvSpPr>
-          <p:cNvPr id="1317745731" name="Subtitle 2"/>
+          <p:cNvPr id="1621527623" name="Subtitle 2"/>
           <p:cNvSpPr>
             <a:spLocks noGrp="1"/>
           </p:cNvSpPr>
@@ -16563,7 +16869,7 @@
       </p:sp>
       <p:sp>
         <p:nvSpPr>
-          <p:cNvPr id="1222242448" name="Subtitle 2"/>
+          <p:cNvPr id="118196996" name="Subtitle 2"/>
           <p:cNvSpPr>
             <a:spLocks noGrp="1"/>
           </p:cNvSpPr>
@@ -16831,7 +17137,7 @@
       </p:sp>
       <p:sp>
         <p:nvSpPr>
-          <p:cNvPr id="687521159" name="Zone de texte 1838115843"/>
+          <p:cNvPr id="730106888" name="Zone de texte 1838115843"/>
           <p:cNvSpPr txBox="1"/>
           <p:nvPr/>
         </p:nvSpPr>
@@ -16939,7 +17245,7 @@
       </p:sp>
       <p:sp>
         <p:nvSpPr>
-          <p:cNvPr id="1485902993" name="Zone de texte 4"/>
+          <p:cNvPr id="1439586584" name="Zone de texte 4"/>
           <p:cNvSpPr txBox="1"/>
           <p:nvPr/>
         </p:nvSpPr>
@@ -16973,7 +17279,7 @@
       </p:sp>
       <p:sp>
         <p:nvSpPr>
-          <p:cNvPr id="536473882" name="Zone de texte 5"/>
+          <p:cNvPr id="1354371462" name="Zone de texte 5"/>
           <p:cNvSpPr txBox="1"/>
           <p:nvPr/>
         </p:nvSpPr>
@@ -17007,7 +17313,7 @@
       </p:sp>
       <p:sp>
         <p:nvSpPr>
-          <p:cNvPr id="188889781" name="Zone de texte 5"/>
+          <p:cNvPr id="230779142" name="Zone de texte 5"/>
           <p:cNvSpPr txBox="1"/>
           <p:nvPr/>
         </p:nvSpPr>
@@ -17071,7 +17377,7 @@
       </p:sp>
       <p:sp>
         <p:nvSpPr>
-          <p:cNvPr id="1068037722" name="Zone de texte 5"/>
+          <p:cNvPr id="264991615" name="Zone de texte 5"/>
           <p:cNvSpPr txBox="1"/>
           <p:nvPr/>
         </p:nvSpPr>
@@ -17105,7 +17411,7 @@
       </p:sp>
       <p:sp>
         <p:nvSpPr>
-          <p:cNvPr id="1064910788" name="Subtitle 2"/>
+          <p:cNvPr id="2022423063" name="Subtitle 2"/>
           <p:cNvSpPr>
             <a:spLocks noGrp="1"/>
           </p:cNvSpPr>
@@ -17376,7 +17682,7 @@
       </p:sp>
       <p:sp>
         <p:nvSpPr>
-          <p:cNvPr id="1278930799" name="Subtitle 2"/>
+          <p:cNvPr id="1850789276" name="Subtitle 2"/>
           <p:cNvSpPr>
             <a:spLocks noGrp="1"/>
           </p:cNvSpPr>
@@ -17644,7 +17950,7 @@
       </p:sp>
       <p:sp>
         <p:nvSpPr>
-          <p:cNvPr id="349595480" name=""/>
+          <p:cNvPr id="999504404" name=""/>
           <p:cNvSpPr/>
           <p:nvPr/>
         </p:nvSpPr>
@@ -17679,7 +17985,7 @@
       </p:sp>
       <p:sp>
         <p:nvSpPr>
-          <p:cNvPr id="1588349050" name=""/>
+          <p:cNvPr id="488966537" name=""/>
           <p:cNvSpPr/>
           <p:nvPr/>
         </p:nvSpPr>
@@ -17717,7 +18023,7 @@
       </p:sp>
       <p:sp>
         <p:nvSpPr>
-          <p:cNvPr id="78283302" name=""/>
+          <p:cNvPr id="932931842" name=""/>
           <p:cNvSpPr txBox="1"/>
           <p:nvPr/>
         </p:nvSpPr>
@@ -17790,7 +18096,7 @@
       </p:grpSpPr>
       <p:sp>
         <p:nvSpPr>
-          <p:cNvPr id="392552086" name="Title 1"/>
+          <p:cNvPr id="1063033180" name="Title 1"/>
           <p:cNvSpPr>
             <a:spLocks noGrp="1"/>
           </p:cNvSpPr>
@@ -17833,7 +18139,7 @@
       </p:sp>
       <p:sp>
         <p:nvSpPr>
-          <p:cNvPr id="1453913775" name="Zone de texte 1838115843"/>
+          <p:cNvPr id="265426619" name="Zone de texte 1838115843"/>
           <p:cNvSpPr txBox="1"/>
           <p:nvPr/>
         </p:nvSpPr>
@@ -17955,7 +18261,7 @@
       </p:sp>
       <p:sp>
         <p:nvSpPr>
-          <p:cNvPr id="1542430448" name="Zone de texte 5"/>
+          <p:cNvPr id="1010718508" name="Zone de texte 5"/>
           <p:cNvSpPr txBox="1"/>
           <p:nvPr/>
         </p:nvSpPr>
@@ -17989,7 +18295,7 @@
       </p:sp>
       <p:sp>
         <p:nvSpPr>
-          <p:cNvPr id="515145090" name="Subtitle 2"/>
+          <p:cNvPr id="1770119845" name="Subtitle 2"/>
           <p:cNvSpPr>
             <a:spLocks noGrp="1"/>
           </p:cNvSpPr>
@@ -18235,7 +18541,7 @@
       </p:sp>
       <p:sp>
         <p:nvSpPr>
-          <p:cNvPr id="746882159" name="Zone de texte 5"/>
+          <p:cNvPr id="812380593" name="Zone de texte 5"/>
           <p:cNvSpPr txBox="1"/>
           <p:nvPr/>
         </p:nvSpPr>
@@ -18406,7 +18712,7 @@
       </p:sp>
       <p:sp>
         <p:nvSpPr>
-          <p:cNvPr id="325982425" name="Zone de texte 5"/>
+          <p:cNvPr id="1283492690" name="Zone de texte 5"/>
           <p:cNvSpPr txBox="1"/>
           <p:nvPr/>
         </p:nvSpPr>
@@ -18446,7 +18752,7 @@
       </p:sp>
       <p:sp>
         <p:nvSpPr>
-          <p:cNvPr id="146189274" name="Zone de texte 5"/>
+          <p:cNvPr id="521594815" name="Zone de texte 5"/>
           <p:cNvSpPr txBox="1"/>
           <p:nvPr/>
         </p:nvSpPr>
@@ -18486,7 +18792,7 @@
       </p:sp>
       <p:sp>
         <p:nvSpPr>
-          <p:cNvPr id="1072905232" name=""/>
+          <p:cNvPr id="474152229" name=""/>
           <p:cNvSpPr txBox="1"/>
           <p:nvPr/>
         </p:nvSpPr>
@@ -18514,7 +18820,7 @@
       </p:sp>
       <p:sp>
         <p:nvSpPr>
-          <p:cNvPr id="1393854360" name="Subtitle 2"/>
+          <p:cNvPr id="1624871583" name="Subtitle 2"/>
           <p:cNvSpPr>
             <a:spLocks noGrp="1"/>
           </p:cNvSpPr>
@@ -18737,7 +19043,7 @@
       </p:sp>
       <p:sp>
         <p:nvSpPr>
-          <p:cNvPr id="1765214596" name="Zone de texte 5"/>
+          <p:cNvPr id="2088430002" name="Zone de texte 5"/>
           <p:cNvSpPr txBox="1"/>
           <p:nvPr/>
         </p:nvSpPr>
@@ -18793,7 +19099,7 @@
       </p:sp>
       <p:sp>
         <p:nvSpPr>
-          <p:cNvPr id="471278069" name="Zone de texte 5"/>
+          <p:cNvPr id="554272550" name="Zone de texte 5"/>
           <p:cNvSpPr txBox="1"/>
           <p:nvPr/>
         </p:nvSpPr>
@@ -18835,7 +19141,7 @@
       </p:sp>
       <p:sp>
         <p:nvSpPr>
-          <p:cNvPr id="463639709" name=""/>
+          <p:cNvPr id="551103236" name=""/>
           <p:cNvSpPr/>
           <p:nvPr/>
         </p:nvSpPr>
@@ -18870,7 +19176,7 @@
       </p:sp>
       <p:sp>
         <p:nvSpPr>
-          <p:cNvPr id="1363816845" name=""/>
+          <p:cNvPr id="1659521286" name=""/>
           <p:cNvSpPr/>
           <p:nvPr/>
         </p:nvSpPr>
@@ -18908,7 +19214,7 @@
       </p:sp>
       <p:sp>
         <p:nvSpPr>
-          <p:cNvPr id="115080241" name=""/>
+          <p:cNvPr id="463243161" name=""/>
           <p:cNvSpPr txBox="1"/>
           <p:nvPr/>
         </p:nvSpPr>
@@ -18981,7 +19287,7 @@
       </p:grpSpPr>
       <p:sp>
         <p:nvSpPr>
-          <p:cNvPr id="689513628" name="Title 1"/>
+          <p:cNvPr id="817011266" name="Title 1"/>
           <p:cNvSpPr>
             <a:spLocks noGrp="1"/>
           </p:cNvSpPr>
@@ -19024,7 +19330,7 @@
       </p:sp>
       <p:sp>
         <p:nvSpPr>
-          <p:cNvPr id="660648733" name="Subtitle 2"/>
+          <p:cNvPr id="1545882621" name="Subtitle 2"/>
           <p:cNvSpPr>
             <a:spLocks noGrp="1"/>
           </p:cNvSpPr>
@@ -19129,7 +19435,7 @@
       </p:sp>
       <p:sp>
         <p:nvSpPr>
-          <p:cNvPr id="39976113" name="Subtitle 2"/>
+          <p:cNvPr id="340081207" name="Subtitle 2"/>
           <p:cNvSpPr>
             <a:spLocks noGrp="1"/>
           </p:cNvSpPr>
@@ -19397,7 +19703,7 @@
       </p:sp>
       <p:sp>
         <p:nvSpPr>
-          <p:cNvPr id="951103293" name="Subtitle 2"/>
+          <p:cNvPr id="276979114" name="Subtitle 2"/>
           <p:cNvSpPr>
             <a:spLocks noGrp="1"/>
           </p:cNvSpPr>
@@ -19665,7 +19971,7 @@
       </p:sp>
       <p:sp>
         <p:nvSpPr>
-          <p:cNvPr id="797596183" name="Zone de texte 1838115843"/>
+          <p:cNvPr id="601219580" name="Zone de texte 1838115843"/>
           <p:cNvSpPr txBox="1"/>
           <p:nvPr/>
         </p:nvSpPr>
@@ -19779,7 +20085,7 @@
       </p:sp>
       <p:sp>
         <p:nvSpPr>
-          <p:cNvPr id="976701647" name="Zone de texte 4"/>
+          <p:cNvPr id="355230384" name="Zone de texte 4"/>
           <p:cNvSpPr txBox="1"/>
           <p:nvPr/>
         </p:nvSpPr>
@@ -19813,7 +20119,7 @@
       </p:sp>
       <p:sp>
         <p:nvSpPr>
-          <p:cNvPr id="1366122766" name="Zone de texte 5"/>
+          <p:cNvPr id="1401834633" name="Zone de texte 5"/>
           <p:cNvSpPr txBox="1"/>
           <p:nvPr/>
         </p:nvSpPr>
@@ -19847,7 +20153,7 @@
       </p:sp>
       <p:sp>
         <p:nvSpPr>
-          <p:cNvPr id="449161379" name="Zone de texte 5"/>
+          <p:cNvPr id="1553696988" name="Zone de texte 5"/>
           <p:cNvSpPr txBox="1"/>
           <p:nvPr/>
         </p:nvSpPr>
@@ -19915,7 +20221,7 @@
       </p:sp>
       <p:sp>
         <p:nvSpPr>
-          <p:cNvPr id="1716672263" name="Zone de texte 5"/>
+          <p:cNvPr id="161021578" name="Zone de texte 5"/>
           <p:cNvSpPr txBox="1"/>
           <p:nvPr/>
         </p:nvSpPr>
@@ -19949,7 +20255,7 @@
       </p:sp>
       <p:sp>
         <p:nvSpPr>
-          <p:cNvPr id="636908611" name="Zone de texte 5"/>
+          <p:cNvPr id="315794580" name="Zone de texte 5"/>
           <p:cNvSpPr txBox="1"/>
           <p:nvPr/>
         </p:nvSpPr>
@@ -19983,7 +20289,7 @@
       </p:sp>
       <p:sp>
         <p:nvSpPr>
-          <p:cNvPr id="132025939" name=""/>
+          <p:cNvPr id="1626471063" name=""/>
           <p:cNvSpPr/>
           <p:nvPr/>
         </p:nvSpPr>
@@ -20018,7 +20324,7 @@
       </p:sp>
       <p:sp>
         <p:nvSpPr>
-          <p:cNvPr id="1558532751" name=""/>
+          <p:cNvPr id="641111077" name=""/>
           <p:cNvSpPr/>
           <p:nvPr/>
         </p:nvSpPr>
@@ -20056,7 +20362,7 @@
       </p:sp>
       <p:sp>
         <p:nvSpPr>
-          <p:cNvPr id="512891929" name=""/>
+          <p:cNvPr id="1254125950" name=""/>
           <p:cNvSpPr txBox="1"/>
           <p:nvPr/>
         </p:nvSpPr>

</xml_diff>